<commit_message>
Update slides with mroe notes
</commit_message>
<xml_diff>
--- a/lean-on-me/Lean on me.pptx
+++ b/lean-on-me/Lean on me.pptx
@@ -5,22 +5,21 @@
     <p:sldMasterId id="2147483648" r:id="rId1"/>
   </p:sldMasterIdLst>
   <p:notesMasterIdLst>
-    <p:notesMasterId r:id="rId15"/>
+    <p:notesMasterId r:id="rId14"/>
   </p:notesMasterIdLst>
   <p:sldIdLst>
     <p:sldId id="256" r:id="rId2"/>
     <p:sldId id="260" r:id="rId3"/>
     <p:sldId id="262" r:id="rId4"/>
     <p:sldId id="263" r:id="rId5"/>
-    <p:sldId id="257" r:id="rId6"/>
-    <p:sldId id="264" r:id="rId7"/>
-    <p:sldId id="258" r:id="rId8"/>
-    <p:sldId id="265" r:id="rId9"/>
-    <p:sldId id="261" r:id="rId10"/>
+    <p:sldId id="261" r:id="rId6"/>
+    <p:sldId id="257" r:id="rId7"/>
+    <p:sldId id="264" r:id="rId8"/>
+    <p:sldId id="258" r:id="rId9"/>
+    <p:sldId id="265" r:id="rId10"/>
     <p:sldId id="259" r:id="rId11"/>
     <p:sldId id="266" r:id="rId12"/>
-    <p:sldId id="267" r:id="rId13"/>
-    <p:sldId id="268" r:id="rId14"/>
+    <p:sldId id="268" r:id="rId13"/>
   </p:sldIdLst>
   <p:sldSz cx="12192000" cy="6858000"/>
   <p:notesSz cx="6858000" cy="9144000"/>
@@ -119,6 +118,11 @@
       </a:defRPr>
     </a:lvl9pPr>
   </p:defaultTextStyle>
+  <p:extLst>
+    <p:ext uri="{EFAFB233-063F-42B5-8137-9DF3F51BA10A}">
+      <p15:sldGuideLst xmlns:p15="http://schemas.microsoft.com/office/powerpoint/2012/main"/>
+    </p:ext>
+  </p:extLst>
 </p:presentation>
 </file>
 
@@ -204,7 +208,7 @@
           <a:p>
             <a:fld id="{5B32551C-E125-462F-8842-2149E658536A}" type="datetimeFigureOut">
               <a:rPr lang="en-GB" smtClean="0"/>
-              <a:t>07/05/2019</a:t>
+              <a:t>14/05/2019</a:t>
             </a:fld>
             <a:endParaRPr lang="en-GB"/>
           </a:p>
@@ -738,12 +742,18 @@
           <a:lstStyle/>
           <a:p>
             <a:r>
-              <a:rPr lang="en-GB" dirty="0">
-                <a:hlinkClick r:id="rId3"/>
-              </a:rPr>
-              <a:t>https://semver.org/</a:t>
-            </a:r>
+              <a:rPr lang="en-GB" dirty="0"/>
+              <a:t>The majority of the PowerShell community aren’t coming from a background in development and are learning about a lot of this stuff as they go. Versioning is one major area that doesn’t get enough attention, for the good of everyone else in the community we need to start following what the dev world is doing in terms of versioning. It helps people adopt your modules and scripts if they know that you’re not going to suddenly break everything when your go from 1.1.x to 1.2.x and that they should review the documentation when you go from 1.3.x to 2.0.x</a:t>
+            </a:r>
+          </a:p>
+          <a:p>
             <a:endParaRPr lang="en-GB" dirty="0"/>
+          </a:p>
+          <a:p>
+            <a:r>
+              <a:rPr lang="en-GB" dirty="0"/>
+              <a:t>https://semver.org</a:t>
+            </a:r>
           </a:p>
           <a:p>
             <a:endParaRPr lang="en-GB" dirty="0"/>
@@ -927,93 +937,40 @@
           <a:p>
             <a:r>
               <a:rPr lang="en-GB" dirty="0"/>
-              <a:t>#Requires -Version &lt;N&gt;[.&lt;n&gt;]</a:t>
-            </a:r>
-          </a:p>
-          <a:p>
-            <a:r>
-              <a:rPr lang="en-GB" dirty="0"/>
-              <a:t>#Requires -</a:t>
+              <a:t>Runtime dependencies can sometimes be seen as an obvious thing but it’s important to be able to document these requirements so that new people picking up the module can start using it easier, but it also comes up whenever you start using a new machine or rebuild yours and forget about something you installed months or years ago and forgot to install this time. Common examples are things like the </a:t>
             </a:r>
             <a:r>
               <a:rPr lang="en-GB" dirty="0" err="1"/>
-              <a:t>PSSnapin</a:t>
-            </a:r>
-            <a:r>
-              <a:rPr lang="en-GB" dirty="0"/>
-              <a:t> &lt;</a:t>
+              <a:t>ActiveDirectory</a:t>
+            </a:r>
+            <a:r>
+              <a:rPr lang="en-GB" dirty="0"/>
+              <a:t> module (via RSAT) or the Az module (or cloud module of choice). These are usually critically important to your module doing what your module is meant to do.</a:t>
+            </a:r>
+          </a:p>
+          <a:p>
+            <a:endParaRPr lang="en-GB" dirty="0"/>
+          </a:p>
+          <a:p>
+            <a:r>
+              <a:rPr lang="en-GB" dirty="0"/>
+              <a:t>Build dependencies are traditionally a developer concern, those in a more sysadmin style role (DBAs, network admins etc) don’t often have to worry about building software or the like (at least directly but they may be partially responsible for the machines those builds run on) but as more people look at automating the processes around their modules we’re seeing more of the “build” process that developers have been using for years. This means we need to worry about what modules and similar we require when carrying out these processes. For me I have a short list of modules that I use in all of my processes, Pester, </a:t>
             </a:r>
             <a:r>
               <a:rPr lang="en-GB" dirty="0" err="1"/>
-              <a:t>PSSnapin</a:t>
-            </a:r>
-            <a:r>
-              <a:rPr lang="en-GB" dirty="0"/>
-              <a:t>-Name&gt; [-Version &lt;N&gt;[.&lt;n&gt;]]</a:t>
-            </a:r>
-          </a:p>
-          <a:p>
-            <a:r>
-              <a:rPr lang="en-GB" dirty="0"/>
-              <a:t>#Requires -Modules { &lt;Module-Name&gt; | &lt;</a:t>
+              <a:t>PSScriptAnalyzer</a:t>
+            </a:r>
+            <a:r>
+              <a:rPr lang="en-GB" dirty="0"/>
+              <a:t>, </a:t>
             </a:r>
             <a:r>
               <a:rPr lang="en-GB" dirty="0" err="1"/>
-              <a:t>Hashtable</a:t>
-            </a:r>
-            <a:r>
-              <a:rPr lang="en-GB" dirty="0"/>
-              <a:t>&gt; }</a:t>
-            </a:r>
-          </a:p>
-          <a:p>
-            <a:r>
-              <a:rPr lang="en-GB" dirty="0"/>
-              <a:t>#Requires -</a:t>
-            </a:r>
-            <a:r>
-              <a:rPr lang="en-GB" dirty="0" err="1"/>
-              <a:t>ShellId</a:t>
-            </a:r>
-            <a:r>
-              <a:rPr lang="en-GB" dirty="0"/>
-              <a:t> &lt;</a:t>
-            </a:r>
-            <a:r>
-              <a:rPr lang="en-GB" dirty="0" err="1"/>
-              <a:t>ShellId</a:t>
-            </a:r>
-            <a:r>
-              <a:rPr lang="en-GB" dirty="0"/>
-              <a:t>&gt;</a:t>
-            </a:r>
-          </a:p>
-          <a:p>
-            <a:r>
-              <a:rPr lang="en-GB" dirty="0"/>
-              <a:t>#Requires –</a:t>
-            </a:r>
-            <a:r>
-              <a:rPr lang="en-GB" dirty="0" err="1"/>
-              <a:t>RunAsAdministrator</a:t>
-            </a:r>
-            <a:endParaRPr lang="en-GB" dirty="0"/>
-          </a:p>
-          <a:p>
-            <a:endParaRPr lang="en-GB" dirty="0"/>
-          </a:p>
-          <a:p>
-            <a:r>
-              <a:rPr lang="en-GB" dirty="0"/>
-              <a:t>Should really only be used for scripts and not modules unless specifying the </a:t>
-            </a:r>
-            <a:r>
-              <a:rPr lang="en-GB" dirty="0" err="1"/>
-              <a:t>RunAsAdministrator</a:t>
-            </a:r>
-            <a:r>
-              <a:rPr lang="en-GB" dirty="0"/>
-              <a:t> requirement.</a:t>
+              <a:t>PlatyPS</a:t>
+            </a:r>
+            <a:r>
+              <a:rPr lang="en-GB" dirty="0"/>
+              <a:t>, Configuration. I also add to this any modules that I have as runtime dependencies as Pester will need to mock their commands for it’s unit testing. </a:t>
             </a:r>
           </a:p>
         </p:txBody>
@@ -1044,7 +1001,580 @@
     </p:spTree>
     <p:extLst>
       <p:ext uri="{BB962C8B-B14F-4D97-AF65-F5344CB8AC3E}">
+        <p14:creationId xmlns:p14="http://schemas.microsoft.com/office/powerpoint/2010/main" val="1672926681"/>
+      </p:ext>
+    </p:extLst>
+  </p:cSld>
+  <p:clrMapOvr>
+    <a:masterClrMapping/>
+  </p:clrMapOvr>
+</p:notes>
+</file>
+
+<file path=ppt/notesSlides/notesSlide5.xml><?xml version="1.0" encoding="utf-8"?>
+<p:notes xmlns:a="http://schemas.openxmlformats.org/drawingml/2006/main" xmlns:r="http://schemas.openxmlformats.org/officeDocument/2006/relationships" xmlns:p="http://schemas.openxmlformats.org/presentationml/2006/main">
+  <p:cSld>
+    <p:spTree>
+      <p:nvGrpSpPr>
+        <p:cNvPr id="1" name=""/>
+        <p:cNvGrpSpPr/>
+        <p:nvPr/>
+      </p:nvGrpSpPr>
+      <p:grpSpPr>
+        <a:xfrm>
+          <a:off x="0" y="0"/>
+          <a:ext cx="0" cy="0"/>
+          <a:chOff x="0" y="0"/>
+          <a:chExt cx="0" cy="0"/>
+        </a:xfrm>
+      </p:grpSpPr>
+      <p:sp>
+        <p:nvSpPr>
+          <p:cNvPr id="2" name="Slide Image Placeholder 1"/>
+          <p:cNvSpPr>
+            <a:spLocks noGrp="1" noRot="1" noChangeAspect="1"/>
+          </p:cNvSpPr>
+          <p:nvPr>
+            <p:ph type="sldImg"/>
+          </p:nvPr>
+        </p:nvSpPr>
+        <p:spPr/>
+      </p:sp>
+      <p:sp>
+        <p:nvSpPr>
+          <p:cNvPr id="3" name="Notes Placeholder 2"/>
+          <p:cNvSpPr>
+            <a:spLocks noGrp="1"/>
+          </p:cNvSpPr>
+          <p:nvPr>
+            <p:ph type="body" idx="1"/>
+          </p:nvPr>
+        </p:nvSpPr>
+        <p:spPr/>
+        <p:txBody>
+          <a:bodyPr/>
+          <a:lstStyle/>
+          <a:p>
+            <a:r>
+              <a:rPr lang="en-GB" dirty="0"/>
+              <a:t>#Requires -Version &lt;N&gt;[.&lt;n&gt;]</a:t>
+            </a:r>
+          </a:p>
+          <a:p>
+            <a:r>
+              <a:rPr lang="en-GB" dirty="0"/>
+              <a:t>#Requires -</a:t>
+            </a:r>
+            <a:r>
+              <a:rPr lang="en-GB" dirty="0" err="1"/>
+              <a:t>PSSnapin</a:t>
+            </a:r>
+            <a:r>
+              <a:rPr lang="en-GB" dirty="0"/>
+              <a:t> &lt;</a:t>
+            </a:r>
+            <a:r>
+              <a:rPr lang="en-GB" dirty="0" err="1"/>
+              <a:t>PSSnapin</a:t>
+            </a:r>
+            <a:r>
+              <a:rPr lang="en-GB" dirty="0"/>
+              <a:t>-Name&gt; [-Version &lt;N&gt;[.&lt;n&gt;]]</a:t>
+            </a:r>
+          </a:p>
+          <a:p>
+            <a:r>
+              <a:rPr lang="en-GB" dirty="0"/>
+              <a:t>#Requires -Modules { &lt;Module-Name&gt; | &lt;</a:t>
+            </a:r>
+            <a:r>
+              <a:rPr lang="en-GB" dirty="0" err="1"/>
+              <a:t>Hashtable</a:t>
+            </a:r>
+            <a:r>
+              <a:rPr lang="en-GB" dirty="0"/>
+              <a:t>&gt; }</a:t>
+            </a:r>
+          </a:p>
+          <a:p>
+            <a:r>
+              <a:rPr lang="en-GB" dirty="0"/>
+              <a:t>#Requires -</a:t>
+            </a:r>
+            <a:r>
+              <a:rPr lang="en-GB" dirty="0" err="1"/>
+              <a:t>ShellId</a:t>
+            </a:r>
+            <a:r>
+              <a:rPr lang="en-GB" dirty="0"/>
+              <a:t> &lt;</a:t>
+            </a:r>
+            <a:r>
+              <a:rPr lang="en-GB" dirty="0" err="1"/>
+              <a:t>ShellId</a:t>
+            </a:r>
+            <a:r>
+              <a:rPr lang="en-GB" dirty="0"/>
+              <a:t>&gt;</a:t>
+            </a:r>
+          </a:p>
+          <a:p>
+            <a:r>
+              <a:rPr lang="en-GB" dirty="0"/>
+              <a:t>#Requires –</a:t>
+            </a:r>
+            <a:r>
+              <a:rPr lang="en-GB" dirty="0" err="1"/>
+              <a:t>RunAsAdministrator</a:t>
+            </a:r>
+            <a:endParaRPr lang="en-GB" dirty="0"/>
+          </a:p>
+          <a:p>
+            <a:endParaRPr lang="en-GB" dirty="0"/>
+          </a:p>
+          <a:p>
+            <a:r>
+              <a:rPr lang="en-GB" dirty="0"/>
+              <a:t>Should really only be used for scripts and not modules unless specifying the </a:t>
+            </a:r>
+            <a:r>
+              <a:rPr lang="en-GB" dirty="0" err="1"/>
+              <a:t>RunAsAdministrator</a:t>
+            </a:r>
+            <a:r>
+              <a:rPr lang="en-GB" dirty="0"/>
+              <a:t> requirement. All of the other options for requirements can be specified in the module manifest and should be to enable better visibility and allow PowerShell to detect it easier.</a:t>
+            </a:r>
+          </a:p>
+          <a:p>
+            <a:endParaRPr lang="en-GB" dirty="0"/>
+          </a:p>
+          <a:p>
+            <a:r>
+              <a:rPr lang="en-GB" dirty="0"/>
+              <a:t>They can’t be used inside a function so need to be declared outside of them.</a:t>
+            </a:r>
+          </a:p>
+          <a:p>
+            <a:endParaRPr lang="en-GB" dirty="0"/>
+          </a:p>
+          <a:p>
+            <a:r>
+              <a:rPr lang="en-GB" dirty="0"/>
+              <a:t>Get-Help </a:t>
+            </a:r>
+            <a:r>
+              <a:rPr lang="en-GB" dirty="0" err="1"/>
+              <a:t>About_Requires</a:t>
+            </a:r>
+            <a:endParaRPr lang="en-GB" dirty="0"/>
+          </a:p>
+        </p:txBody>
+      </p:sp>
+      <p:sp>
+        <p:nvSpPr>
+          <p:cNvPr id="4" name="Slide Number Placeholder 3"/>
+          <p:cNvSpPr>
+            <a:spLocks noGrp="1"/>
+          </p:cNvSpPr>
+          <p:nvPr>
+            <p:ph type="sldNum" sz="quarter" idx="5"/>
+          </p:nvPr>
+        </p:nvSpPr>
+        <p:spPr/>
+        <p:txBody>
+          <a:bodyPr/>
+          <a:lstStyle/>
+          <a:p>
+            <a:fld id="{0B5B1F1C-CD78-43C3-8BF1-558E51F83C81}" type="slidenum">
+              <a:rPr lang="en-GB" smtClean="0"/>
+              <a:t>6</a:t>
+            </a:fld>
+            <a:endParaRPr lang="en-GB"/>
+          </a:p>
+        </p:txBody>
+      </p:sp>
+    </p:spTree>
+    <p:extLst>
+      <p:ext uri="{BB962C8B-B14F-4D97-AF65-F5344CB8AC3E}">
         <p14:creationId xmlns:p14="http://schemas.microsoft.com/office/powerpoint/2010/main" val="106085788"/>
+      </p:ext>
+    </p:extLst>
+  </p:cSld>
+  <p:clrMapOvr>
+    <a:masterClrMapping/>
+  </p:clrMapOvr>
+</p:notes>
+</file>
+
+<file path=ppt/notesSlides/notesSlide6.xml><?xml version="1.0" encoding="utf-8"?>
+<p:notes xmlns:a="http://schemas.openxmlformats.org/drawingml/2006/main" xmlns:r="http://schemas.openxmlformats.org/officeDocument/2006/relationships" xmlns:p="http://schemas.openxmlformats.org/presentationml/2006/main">
+  <p:cSld>
+    <p:spTree>
+      <p:nvGrpSpPr>
+        <p:cNvPr id="1" name=""/>
+        <p:cNvGrpSpPr/>
+        <p:nvPr/>
+      </p:nvGrpSpPr>
+      <p:grpSpPr>
+        <a:xfrm>
+          <a:off x="0" y="0"/>
+          <a:ext cx="0" cy="0"/>
+          <a:chOff x="0" y="0"/>
+          <a:chExt cx="0" cy="0"/>
+        </a:xfrm>
+      </p:grpSpPr>
+      <p:sp>
+        <p:nvSpPr>
+          <p:cNvPr id="2" name="Slide Image Placeholder 1"/>
+          <p:cNvSpPr>
+            <a:spLocks noGrp="1" noRot="1" noChangeAspect="1"/>
+          </p:cNvSpPr>
+          <p:nvPr>
+            <p:ph type="sldImg"/>
+          </p:nvPr>
+        </p:nvSpPr>
+        <p:spPr/>
+      </p:sp>
+      <p:sp>
+        <p:nvSpPr>
+          <p:cNvPr id="3" name="Notes Placeholder 2"/>
+          <p:cNvSpPr>
+            <a:spLocks noGrp="1"/>
+          </p:cNvSpPr>
+          <p:nvPr>
+            <p:ph type="body" idx="1"/>
+          </p:nvPr>
+        </p:nvSpPr>
+        <p:spPr/>
+        <p:txBody>
+          <a:bodyPr/>
+          <a:lstStyle/>
+          <a:p>
+            <a:r>
+              <a:rPr lang="en-GB" dirty="0"/>
+              <a:t>This should be your main choice when detailing what your module requires to run. This is true of any requirement you have for a module that you’d consider using #requires for in a script except </a:t>
+            </a:r>
+            <a:r>
+              <a:rPr lang="en-GB" dirty="0" err="1"/>
+              <a:t>RunAsAdministrator</a:t>
+            </a:r>
+            <a:r>
+              <a:rPr lang="en-GB" dirty="0"/>
+              <a:t>.</a:t>
+            </a:r>
+          </a:p>
+          <a:p>
+            <a:endParaRPr lang="en-GB" dirty="0"/>
+          </a:p>
+          <a:p>
+            <a:r>
+              <a:rPr lang="en-GB" dirty="0"/>
+              <a:t>If your module doesn’t have a manifest then I’d strongly recommend creating one. It’ll allow you to handle a lot of metadata about your module, let you publish it to the public gallery or a private one, and let you handle dependencies like this.</a:t>
+            </a:r>
+          </a:p>
+          <a:p>
+            <a:endParaRPr lang="en-GB" dirty="0"/>
+          </a:p>
+          <a:p>
+            <a:r>
+              <a:rPr lang="en-GB" dirty="0"/>
+              <a:t>The three formats for defining required modules are just the name, the name and module version (or required version), and the name, version and GUID. Be as explicit as you need to be, I stick with name and version but environments with more strict security requirements should also use the GUID to ensure it’s the same module.</a:t>
+            </a:r>
+          </a:p>
+          <a:p>
+            <a:endParaRPr lang="en-GB" dirty="0"/>
+          </a:p>
+          <a:p>
+            <a:r>
+              <a:rPr lang="en-GB" dirty="0" err="1"/>
+              <a:t>PowerShellGet</a:t>
+            </a:r>
+            <a:r>
+              <a:rPr lang="en-GB" dirty="0"/>
+              <a:t> will read the </a:t>
+            </a:r>
+            <a:r>
+              <a:rPr lang="en-GB" dirty="0" err="1"/>
+              <a:t>RequiredModules</a:t>
+            </a:r>
+            <a:r>
+              <a:rPr lang="en-GB" dirty="0"/>
+              <a:t> and install it where it can. I believe it prioritises the same repository as it’s pulling this module from but should look to other repositories if the dependencies aren’t available there.</a:t>
+            </a:r>
+          </a:p>
+        </p:txBody>
+      </p:sp>
+      <p:sp>
+        <p:nvSpPr>
+          <p:cNvPr id="4" name="Slide Number Placeholder 3"/>
+          <p:cNvSpPr>
+            <a:spLocks noGrp="1"/>
+          </p:cNvSpPr>
+          <p:nvPr>
+            <p:ph type="sldNum" sz="quarter" idx="5"/>
+          </p:nvPr>
+        </p:nvSpPr>
+        <p:spPr/>
+        <p:txBody>
+          <a:bodyPr/>
+          <a:lstStyle/>
+          <a:p>
+            <a:fld id="{0B5B1F1C-CD78-43C3-8BF1-558E51F83C81}" type="slidenum">
+              <a:rPr lang="en-GB" smtClean="0"/>
+              <a:t>8</a:t>
+            </a:fld>
+            <a:endParaRPr lang="en-GB"/>
+          </a:p>
+        </p:txBody>
+      </p:sp>
+    </p:spTree>
+    <p:extLst>
+      <p:ext uri="{BB962C8B-B14F-4D97-AF65-F5344CB8AC3E}">
+        <p14:creationId xmlns:p14="http://schemas.microsoft.com/office/powerpoint/2010/main" val="3160020979"/>
+      </p:ext>
+    </p:extLst>
+  </p:cSld>
+  <p:clrMapOvr>
+    <a:masterClrMapping/>
+  </p:clrMapOvr>
+</p:notes>
+</file>
+
+<file path=ppt/notesSlides/notesSlide7.xml><?xml version="1.0" encoding="utf-8"?>
+<p:notes xmlns:a="http://schemas.openxmlformats.org/drawingml/2006/main" xmlns:r="http://schemas.openxmlformats.org/officeDocument/2006/relationships" xmlns:p="http://schemas.openxmlformats.org/presentationml/2006/main">
+  <p:cSld>
+    <p:spTree>
+      <p:nvGrpSpPr>
+        <p:cNvPr id="1" name=""/>
+        <p:cNvGrpSpPr/>
+        <p:nvPr/>
+      </p:nvGrpSpPr>
+      <p:grpSpPr>
+        <a:xfrm>
+          <a:off x="0" y="0"/>
+          <a:ext cx="0" cy="0"/>
+          <a:chOff x="0" y="0"/>
+          <a:chExt cx="0" cy="0"/>
+        </a:xfrm>
+      </p:grpSpPr>
+      <p:sp>
+        <p:nvSpPr>
+          <p:cNvPr id="2" name="Slide Image Placeholder 1"/>
+          <p:cNvSpPr>
+            <a:spLocks noGrp="1" noRot="1" noChangeAspect="1"/>
+          </p:cNvSpPr>
+          <p:nvPr>
+            <p:ph type="sldImg"/>
+          </p:nvPr>
+        </p:nvSpPr>
+        <p:spPr/>
+      </p:sp>
+      <p:sp>
+        <p:nvSpPr>
+          <p:cNvPr id="3" name="Notes Placeholder 2"/>
+          <p:cNvSpPr>
+            <a:spLocks noGrp="1"/>
+          </p:cNvSpPr>
+          <p:nvPr>
+            <p:ph type="body" idx="1"/>
+          </p:nvPr>
+        </p:nvSpPr>
+        <p:spPr/>
+        <p:txBody>
+          <a:bodyPr/>
+          <a:lstStyle/>
+          <a:p>
+            <a:r>
+              <a:rPr lang="en-GB" dirty="0"/>
+              <a:t>A very useful module from Warren Frame (</a:t>
+            </a:r>
+            <a:r>
+              <a:rPr lang="en-GB" dirty="0" err="1"/>
+              <a:t>RamblingCookieMonster</a:t>
+            </a:r>
+            <a:r>
+              <a:rPr lang="en-GB" dirty="0"/>
+              <a:t>/</a:t>
+            </a:r>
+            <a:r>
+              <a:rPr lang="en-GB" dirty="0" err="1"/>
+              <a:t>PSCookieMonster</a:t>
+            </a:r>
+            <a:r>
+              <a:rPr lang="en-GB" dirty="0"/>
+              <a:t>) that helps manage the dependencies your module has and track those as the code evolves. It works best if you’re using source control (please be using source control) and a CI pipeline but neither is required to use the module. </a:t>
+            </a:r>
+          </a:p>
+          <a:p>
+            <a:endParaRPr lang="en-GB" dirty="0"/>
+          </a:p>
+          <a:p>
+            <a:r>
+              <a:rPr lang="en-GB" dirty="0"/>
+              <a:t>My main use of it is to ensure all my build time dependencies are there for my CI pipeline (and local builds). It can handle more than just modules as well, it’ll handle normal </a:t>
+            </a:r>
+            <a:r>
+              <a:rPr lang="en-GB" dirty="0" err="1"/>
+              <a:t>nuget</a:t>
+            </a:r>
+            <a:r>
+              <a:rPr lang="en-GB" dirty="0"/>
+              <a:t> packages, </a:t>
+            </a:r>
+            <a:r>
+              <a:rPr lang="en-GB" dirty="0" err="1"/>
+              <a:t>github</a:t>
+            </a:r>
+            <a:r>
+              <a:rPr lang="en-GB" dirty="0"/>
+              <a:t> repos (or any old git repo), </a:t>
+            </a:r>
+            <a:r>
+              <a:rPr lang="en-GB" dirty="0" err="1"/>
+              <a:t>npm</a:t>
+            </a:r>
+            <a:r>
+              <a:rPr lang="en-GB" dirty="0"/>
+              <a:t> and more. Get-</a:t>
+            </a:r>
+            <a:r>
+              <a:rPr lang="en-GB" dirty="0" err="1"/>
+              <a:t>PSDependType</a:t>
+            </a:r>
+            <a:r>
+              <a:rPr lang="en-GB" dirty="0"/>
+              <a:t> will list them all out along with descriptions. It’s also very extensible if there is another type of dependency you want to handle with it (and PR it back to the module if possible).</a:t>
+            </a:r>
+          </a:p>
+          <a:p>
+            <a:endParaRPr lang="en-GB" dirty="0"/>
+          </a:p>
+          <a:p>
+            <a:endParaRPr lang="en-GB" dirty="0"/>
+          </a:p>
+          <a:p>
+            <a:endParaRPr lang="en-GB" dirty="0"/>
+          </a:p>
+          <a:p>
+            <a:r>
+              <a:rPr lang="en-GB" dirty="0"/>
+              <a:t>https://github.com/RamblingCookieMonster/PSDepend</a:t>
+            </a:r>
+          </a:p>
+        </p:txBody>
+      </p:sp>
+      <p:sp>
+        <p:nvSpPr>
+          <p:cNvPr id="4" name="Slide Number Placeholder 3"/>
+          <p:cNvSpPr>
+            <a:spLocks noGrp="1"/>
+          </p:cNvSpPr>
+          <p:nvPr>
+            <p:ph type="sldNum" sz="quarter" idx="5"/>
+          </p:nvPr>
+        </p:nvSpPr>
+        <p:spPr/>
+        <p:txBody>
+          <a:bodyPr/>
+          <a:lstStyle/>
+          <a:p>
+            <a:fld id="{0B5B1F1C-CD78-43C3-8BF1-558E51F83C81}" type="slidenum">
+              <a:rPr lang="en-GB" smtClean="0"/>
+              <a:t>10</a:t>
+            </a:fld>
+            <a:endParaRPr lang="en-GB"/>
+          </a:p>
+        </p:txBody>
+      </p:sp>
+    </p:spTree>
+    <p:extLst>
+      <p:ext uri="{BB962C8B-B14F-4D97-AF65-F5344CB8AC3E}">
+        <p14:creationId xmlns:p14="http://schemas.microsoft.com/office/powerpoint/2010/main" val="454638995"/>
+      </p:ext>
+    </p:extLst>
+  </p:cSld>
+  <p:clrMapOvr>
+    <a:masterClrMapping/>
+  </p:clrMapOvr>
+</p:notes>
+</file>
+
+<file path=ppt/notesSlides/notesSlide8.xml><?xml version="1.0" encoding="utf-8"?>
+<p:notes xmlns:a="http://schemas.openxmlformats.org/drawingml/2006/main" xmlns:r="http://schemas.openxmlformats.org/officeDocument/2006/relationships" xmlns:p="http://schemas.openxmlformats.org/presentationml/2006/main">
+  <p:cSld>
+    <p:spTree>
+      <p:nvGrpSpPr>
+        <p:cNvPr id="1" name=""/>
+        <p:cNvGrpSpPr/>
+        <p:nvPr/>
+      </p:nvGrpSpPr>
+      <p:grpSpPr>
+        <a:xfrm>
+          <a:off x="0" y="0"/>
+          <a:ext cx="0" cy="0"/>
+          <a:chOff x="0" y="0"/>
+          <a:chExt cx="0" cy="0"/>
+        </a:xfrm>
+      </p:grpSpPr>
+      <p:sp>
+        <p:nvSpPr>
+          <p:cNvPr id="2" name="Slide Image Placeholder 1"/>
+          <p:cNvSpPr>
+            <a:spLocks noGrp="1" noRot="1" noChangeAspect="1"/>
+          </p:cNvSpPr>
+          <p:nvPr>
+            <p:ph type="sldImg"/>
+          </p:nvPr>
+        </p:nvSpPr>
+        <p:spPr/>
+      </p:sp>
+      <p:sp>
+        <p:nvSpPr>
+          <p:cNvPr id="3" name="Notes Placeholder 2"/>
+          <p:cNvSpPr>
+            <a:spLocks noGrp="1"/>
+          </p:cNvSpPr>
+          <p:nvPr>
+            <p:ph type="body" idx="1"/>
+          </p:nvPr>
+        </p:nvSpPr>
+        <p:spPr/>
+        <p:txBody>
+          <a:bodyPr/>
+          <a:lstStyle/>
+          <a:p>
+            <a:endParaRPr lang="en-GB" dirty="0"/>
+          </a:p>
+        </p:txBody>
+      </p:sp>
+      <p:sp>
+        <p:nvSpPr>
+          <p:cNvPr id="4" name="Slide Number Placeholder 3"/>
+          <p:cNvSpPr>
+            <a:spLocks noGrp="1"/>
+          </p:cNvSpPr>
+          <p:nvPr>
+            <p:ph type="sldNum" sz="quarter" idx="5"/>
+          </p:nvPr>
+        </p:nvSpPr>
+        <p:spPr/>
+        <p:txBody>
+          <a:bodyPr/>
+          <a:lstStyle/>
+          <a:p>
+            <a:fld id="{0B5B1F1C-CD78-43C3-8BF1-558E51F83C81}" type="slidenum">
+              <a:rPr lang="en-GB" smtClean="0"/>
+              <a:t>12</a:t>
+            </a:fld>
+            <a:endParaRPr lang="en-GB"/>
+          </a:p>
+        </p:txBody>
+      </p:sp>
+    </p:spTree>
+    <p:extLst>
+      <p:ext uri="{BB962C8B-B14F-4D97-AF65-F5344CB8AC3E}">
+        <p14:creationId xmlns:p14="http://schemas.microsoft.com/office/powerpoint/2010/main" val="3014240283"/>
       </p:ext>
     </p:extLst>
   </p:cSld>
@@ -1203,7 +1733,7 @@
           <a:p>
             <a:fld id="{42B366DA-0315-4031-8173-03CBA2F90823}" type="datetimeFigureOut">
               <a:rPr lang="en-GB" smtClean="0"/>
-              <a:t>07/05/2019</a:t>
+              <a:t>14/05/2019</a:t>
             </a:fld>
             <a:endParaRPr lang="en-GB"/>
           </a:p>
@@ -1403,7 +1933,7 @@
           <a:p>
             <a:fld id="{42B366DA-0315-4031-8173-03CBA2F90823}" type="datetimeFigureOut">
               <a:rPr lang="en-GB" smtClean="0"/>
-              <a:t>07/05/2019</a:t>
+              <a:t>14/05/2019</a:t>
             </a:fld>
             <a:endParaRPr lang="en-GB"/>
           </a:p>
@@ -1613,7 +2143,7 @@
           <a:p>
             <a:fld id="{42B366DA-0315-4031-8173-03CBA2F90823}" type="datetimeFigureOut">
               <a:rPr lang="en-GB" smtClean="0"/>
-              <a:t>07/05/2019</a:t>
+              <a:t>14/05/2019</a:t>
             </a:fld>
             <a:endParaRPr lang="en-GB"/>
           </a:p>
@@ -1813,7 +2343,7 @@
           <a:p>
             <a:fld id="{42B366DA-0315-4031-8173-03CBA2F90823}" type="datetimeFigureOut">
               <a:rPr lang="en-GB" smtClean="0"/>
-              <a:t>07/05/2019</a:t>
+              <a:t>14/05/2019</a:t>
             </a:fld>
             <a:endParaRPr lang="en-GB"/>
           </a:p>
@@ -2089,7 +2619,7 @@
           <a:p>
             <a:fld id="{42B366DA-0315-4031-8173-03CBA2F90823}" type="datetimeFigureOut">
               <a:rPr lang="en-GB" smtClean="0"/>
-              <a:t>07/05/2019</a:t>
+              <a:t>14/05/2019</a:t>
             </a:fld>
             <a:endParaRPr lang="en-GB"/>
           </a:p>
@@ -2357,7 +2887,7 @@
           <a:p>
             <a:fld id="{42B366DA-0315-4031-8173-03CBA2F90823}" type="datetimeFigureOut">
               <a:rPr lang="en-GB" smtClean="0"/>
-              <a:t>07/05/2019</a:t>
+              <a:t>14/05/2019</a:t>
             </a:fld>
             <a:endParaRPr lang="en-GB"/>
           </a:p>
@@ -2772,7 +3302,7 @@
           <a:p>
             <a:fld id="{42B366DA-0315-4031-8173-03CBA2F90823}" type="datetimeFigureOut">
               <a:rPr lang="en-GB" smtClean="0"/>
-              <a:t>07/05/2019</a:t>
+              <a:t>14/05/2019</a:t>
             </a:fld>
             <a:endParaRPr lang="en-GB"/>
           </a:p>
@@ -2914,7 +3444,7 @@
           <a:p>
             <a:fld id="{42B366DA-0315-4031-8173-03CBA2F90823}" type="datetimeFigureOut">
               <a:rPr lang="en-GB" smtClean="0"/>
-              <a:t>07/05/2019</a:t>
+              <a:t>14/05/2019</a:t>
             </a:fld>
             <a:endParaRPr lang="en-GB"/>
           </a:p>
@@ -3027,7 +3557,7 @@
           <a:p>
             <a:fld id="{42B366DA-0315-4031-8173-03CBA2F90823}" type="datetimeFigureOut">
               <a:rPr lang="en-GB" smtClean="0"/>
-              <a:t>07/05/2019</a:t>
+              <a:t>14/05/2019</a:t>
             </a:fld>
             <a:endParaRPr lang="en-GB"/>
           </a:p>
@@ -3340,7 +3870,7 @@
           <a:p>
             <a:fld id="{42B366DA-0315-4031-8173-03CBA2F90823}" type="datetimeFigureOut">
               <a:rPr lang="en-GB" smtClean="0"/>
-              <a:t>07/05/2019</a:t>
+              <a:t>14/05/2019</a:t>
             </a:fld>
             <a:endParaRPr lang="en-GB"/>
           </a:p>
@@ -3629,7 +4159,7 @@
           <a:p>
             <a:fld id="{42B366DA-0315-4031-8173-03CBA2F90823}" type="datetimeFigureOut">
               <a:rPr lang="en-GB" smtClean="0"/>
-              <a:t>07/05/2019</a:t>
+              <a:t>14/05/2019</a:t>
             </a:fld>
             <a:endParaRPr lang="en-GB"/>
           </a:p>
@@ -3872,7 +4402,7 @@
           <a:p>
             <a:fld id="{42B366DA-0315-4031-8173-03CBA2F90823}" type="datetimeFigureOut">
               <a:rPr lang="en-GB" smtClean="0"/>
-              <a:t>07/05/2019</a:t>
+              <a:t>14/05/2019</a:t>
             </a:fld>
             <a:endParaRPr lang="en-GB"/>
           </a:p>
@@ -4497,9 +5027,24 @@
             <a:endParaRPr lang="en-GB" dirty="0"/>
           </a:p>
           <a:p>
+            <a:endParaRPr lang="en-GB" dirty="0"/>
+          </a:p>
+          <a:p>
             <a:r>
               <a:rPr lang="en-GB" dirty="0"/>
               <a:t>Primarily for Build dependencies</a:t>
+            </a:r>
+          </a:p>
+          <a:p>
+            <a:endParaRPr lang="en-GB" dirty="0"/>
+          </a:p>
+          <a:p>
+            <a:endParaRPr lang="en-GB" dirty="0"/>
+          </a:p>
+          <a:p>
+            <a:r>
+              <a:rPr lang="en-GB" dirty="0"/>
+              <a:t>Handles more than just modules</a:t>
             </a:r>
           </a:p>
         </p:txBody>
@@ -4741,148 +5286,6 @@
       </p:grpSpPr>
       <p:sp>
         <p:nvSpPr>
-          <p:cNvPr id="4" name="Title 3">
-            <a:extLst>
-              <a:ext uri="{FF2B5EF4-FFF2-40B4-BE49-F238E27FC236}">
-                <a16:creationId xmlns:a16="http://schemas.microsoft.com/office/drawing/2014/main" id="{68865EA2-8272-416A-B480-F5D68081EFAB}"/>
-              </a:ext>
-            </a:extLst>
-          </p:cNvPr>
-          <p:cNvSpPr>
-            <a:spLocks noGrp="1"/>
-          </p:cNvSpPr>
-          <p:nvPr>
-            <p:ph type="title"/>
-          </p:nvPr>
-        </p:nvSpPr>
-        <p:spPr/>
-        <p:txBody>
-          <a:bodyPr/>
-          <a:lstStyle/>
-          <a:p>
-            <a:r>
-              <a:rPr lang="en-GB" dirty="0"/>
-              <a:t>Questions?</a:t>
-            </a:r>
-          </a:p>
-        </p:txBody>
-      </p:sp>
-      <p:sp>
-        <p:nvSpPr>
-          <p:cNvPr id="5" name="Content Placeholder 4">
-            <a:extLst>
-              <a:ext uri="{FF2B5EF4-FFF2-40B4-BE49-F238E27FC236}">
-                <a16:creationId xmlns:a16="http://schemas.microsoft.com/office/drawing/2014/main" id="{90B03F7B-3023-4D52-B950-E8AC1D19AD58}"/>
-              </a:ext>
-            </a:extLst>
-          </p:cNvPr>
-          <p:cNvSpPr>
-            <a:spLocks noGrp="1"/>
-          </p:cNvSpPr>
-          <p:nvPr>
-            <p:ph idx="1"/>
-          </p:nvPr>
-        </p:nvSpPr>
-        <p:spPr/>
-        <p:txBody>
-          <a:bodyPr/>
-          <a:lstStyle/>
-          <a:p>
-            <a:endParaRPr lang="en-GB"/>
-          </a:p>
-        </p:txBody>
-      </p:sp>
-      <p:sp>
-        <p:nvSpPr>
-          <p:cNvPr id="6" name="TextBox 5">
-            <a:extLst>
-              <a:ext uri="{FF2B5EF4-FFF2-40B4-BE49-F238E27FC236}">
-                <a16:creationId xmlns:a16="http://schemas.microsoft.com/office/drawing/2014/main" id="{425B9024-6A93-427C-842A-495FAF52755E}"/>
-              </a:ext>
-            </a:extLst>
-          </p:cNvPr>
-          <p:cNvSpPr txBox="1"/>
-          <p:nvPr/>
-        </p:nvSpPr>
-        <p:spPr>
-          <a:xfrm>
-            <a:off x="3903464" y="6407943"/>
-            <a:ext cx="4385071" cy="369332"/>
-          </a:xfrm>
-          <a:prstGeom prst="rect">
-            <a:avLst/>
-          </a:prstGeom>
-          <a:noFill/>
-        </p:spPr>
-        <p:txBody>
-          <a:bodyPr wrap="square" rtlCol="0">
-            <a:spAutoFit/>
-          </a:bodyPr>
-          <a:lstStyle/>
-          <a:p>
-            <a:pPr algn="ctr"/>
-            <a:r>
-              <a:rPr lang="en-GB" dirty="0">
-                <a:solidFill>
-                  <a:schemeClr val="bg1">
-                    <a:lumMod val="50000"/>
-                  </a:schemeClr>
-                </a:solidFill>
-              </a:rPr>
-              <a:t>        Chris Gardner | @</a:t>
-            </a:r>
-            <a:r>
-              <a:rPr lang="en-GB" dirty="0" err="1">
-                <a:solidFill>
-                  <a:schemeClr val="bg1">
-                    <a:lumMod val="50000"/>
-                  </a:schemeClr>
-                </a:solidFill>
-              </a:rPr>
-              <a:t>HalbaradKenafin</a:t>
-            </a:r>
-            <a:endParaRPr lang="en-GB" dirty="0">
-              <a:solidFill>
-                <a:schemeClr val="bg1">
-                  <a:lumMod val="50000"/>
-                </a:schemeClr>
-              </a:solidFill>
-            </a:endParaRPr>
-          </a:p>
-        </p:txBody>
-      </p:sp>
-    </p:spTree>
-    <p:extLst>
-      <p:ext uri="{BB962C8B-B14F-4D97-AF65-F5344CB8AC3E}">
-        <p14:creationId xmlns:p14="http://schemas.microsoft.com/office/powerpoint/2010/main" val="542693355"/>
-      </p:ext>
-    </p:extLst>
-  </p:cSld>
-  <p:clrMapOvr>
-    <a:masterClrMapping/>
-  </p:clrMapOvr>
-</p:sld>
-</file>
-
-<file path=ppt/slides/slide13.xml><?xml version="1.0" encoding="utf-8"?>
-<p:sld xmlns:a="http://schemas.openxmlformats.org/drawingml/2006/main" xmlns:r="http://schemas.openxmlformats.org/officeDocument/2006/relationships" xmlns:p="http://schemas.openxmlformats.org/presentationml/2006/main">
-  <p:cSld>
-    <p:spTree>
-      <p:nvGrpSpPr>
-        <p:cNvPr id="1" name=""/>
-        <p:cNvGrpSpPr/>
-        <p:nvPr/>
-      </p:nvGrpSpPr>
-      <p:grpSpPr>
-        <a:xfrm>
-          <a:off x="0" y="0"/>
-          <a:ext cx="0" cy="0"/>
-          <a:chOff x="0" y="0"/>
-          <a:chExt cx="0" cy="0"/>
-        </a:xfrm>
-      </p:grpSpPr>
-      <p:sp>
-        <p:nvSpPr>
           <p:cNvPr id="2" name="Title 1">
             <a:extLst>
               <a:ext uri="{FF2B5EF4-FFF2-40B4-BE49-F238E27FC236}">
@@ -4961,15 +5364,18 @@
           <a:p>
             <a:r>
               <a:rPr lang="en-GB" dirty="0"/>
-              <a:t>Slack/Discord: aka.ms/</a:t>
+              <a:t>Slack: aka.ms/</a:t>
             </a:r>
             <a:r>
               <a:rPr lang="en-GB" dirty="0" err="1"/>
               <a:t>psslack</a:t>
             </a:r>
-            <a:r>
-              <a:rPr lang="en-GB" dirty="0"/>
-              <a:t> or aka.ms/</a:t>
+            <a:endParaRPr lang="en-GB" dirty="0"/>
+          </a:p>
+          <a:p>
+            <a:r>
+              <a:rPr lang="en-GB" dirty="0"/>
+              <a:t>Discord: aka.ms/</a:t>
             </a:r>
             <a:r>
               <a:rPr lang="en-GB" dirty="0" err="1"/>
@@ -4978,7 +5384,10 @@
             <a:endParaRPr lang="en-GB" dirty="0"/>
           </a:p>
           <a:p>
-            <a:endParaRPr lang="en-GB" dirty="0"/>
+            <a:r>
+              <a:rPr lang="en-GB" dirty="0"/>
+              <a:t>@Halbarad on both</a:t>
+            </a:r>
           </a:p>
         </p:txBody>
       </p:sp>
@@ -5128,6 +5537,12 @@
           <a:p>
             <a:r>
               <a:rPr lang="en-GB" dirty="0"/>
+              <a:t>Dependency Types</a:t>
+            </a:r>
+          </a:p>
+          <a:p>
+            <a:r>
+              <a:rPr lang="en-GB" dirty="0"/>
               <a:t>#Requires</a:t>
             </a:r>
           </a:p>
@@ -5137,12 +5552,6 @@
               <a:t>RequiredModules</a:t>
             </a:r>
             <a:endParaRPr lang="en-GB" dirty="0"/>
-          </a:p>
-          <a:p>
-            <a:r>
-              <a:rPr lang="en-GB" dirty="0"/>
-              <a:t>Dependency Types</a:t>
-            </a:r>
           </a:p>
           <a:p>
             <a:r>
@@ -5587,7 +5996,7 @@
           <p:cNvPr id="2" name="Title 1">
             <a:extLst>
               <a:ext uri="{FF2B5EF4-FFF2-40B4-BE49-F238E27FC236}">
-                <a16:creationId xmlns:a16="http://schemas.microsoft.com/office/drawing/2014/main" id="{7EBA6A92-4528-473D-8018-CF2559DE5245}"/>
+                <a16:creationId xmlns:a16="http://schemas.microsoft.com/office/drawing/2014/main" id="{0C6709AC-94A8-40C8-A8F7-7C00BE0EAE47}"/>
               </a:ext>
             </a:extLst>
           </p:cNvPr>
@@ -5605,7 +6014,7 @@
           <a:p>
             <a:r>
               <a:rPr lang="en-GB" dirty="0"/>
-              <a:t>#Requires</a:t>
+              <a:t>Dependency Types</a:t>
             </a:r>
           </a:p>
         </p:txBody>
@@ -5615,7 +6024,7 @@
           <p:cNvPr id="3" name="Content Placeholder 2">
             <a:extLst>
               <a:ext uri="{FF2B5EF4-FFF2-40B4-BE49-F238E27FC236}">
-                <a16:creationId xmlns:a16="http://schemas.microsoft.com/office/drawing/2014/main" id="{F7C775E7-DB41-4B0C-B9CA-EC96CB84F172}"/>
+                <a16:creationId xmlns:a16="http://schemas.microsoft.com/office/drawing/2014/main" id="{69DC5609-04D2-4E77-8FBC-2B95AB165047}"/>
               </a:ext>
             </a:extLst>
           </p:cNvPr>
@@ -5633,7 +6042,14 @@
           <a:p>
             <a:r>
               <a:rPr lang="en-GB" dirty="0"/>
-              <a:t>Must be the first thing on a line</a:t>
+              <a:t>Runtime dependencies</a:t>
+            </a:r>
+          </a:p>
+          <a:p>
+            <a:pPr lvl="1"/>
+            <a:r>
+              <a:rPr lang="en-GB" dirty="0"/>
+              <a:t>Stuff your module/script needs to run</a:t>
             </a:r>
           </a:p>
           <a:p>
@@ -5642,28 +6058,15 @@
           <a:p>
             <a:r>
               <a:rPr lang="en-GB" dirty="0"/>
-              <a:t>Can be used for Modules, </a:t>
-            </a:r>
-            <a:r>
-              <a:rPr lang="en-GB" dirty="0" err="1"/>
-              <a:t>RunAsAdministrator</a:t>
-            </a:r>
-            <a:r>
-              <a:rPr lang="en-GB" dirty="0"/>
-              <a:t>, Version and more</a:t>
-            </a:r>
-          </a:p>
-          <a:p>
-            <a:endParaRPr lang="en-GB" dirty="0"/>
-          </a:p>
-          <a:p>
-            <a:r>
-              <a:rPr lang="en-GB" dirty="0"/>
-              <a:t>Usually declared at the top of a script for visibility</a:t>
-            </a:r>
-          </a:p>
-          <a:p>
-            <a:endParaRPr lang="en-GB" dirty="0"/>
+              <a:t>Build dependencies</a:t>
+            </a:r>
+          </a:p>
+          <a:p>
+            <a:pPr lvl="1"/>
+            <a:r>
+              <a:rPr lang="en-GB" dirty="0"/>
+              <a:t>Stuff your module/script needs to “build”/test</a:t>
+            </a:r>
           </a:p>
         </p:txBody>
       </p:sp>
@@ -5672,7 +6075,7 @@
           <p:cNvPr id="4" name="TextBox 3">
             <a:extLst>
               <a:ext uri="{FF2B5EF4-FFF2-40B4-BE49-F238E27FC236}">
-                <a16:creationId xmlns:a16="http://schemas.microsoft.com/office/drawing/2014/main" id="{D6AC2279-7E42-4E90-9F37-881CA4DB558E}"/>
+                <a16:creationId xmlns:a16="http://schemas.microsoft.com/office/drawing/2014/main" id="{F4F6AFB8-3821-44B6-809A-235D8A93335B}"/>
               </a:ext>
             </a:extLst>
           </p:cNvPr>
@@ -5681,7 +6084,7 @@
         </p:nvSpPr>
         <p:spPr>
           <a:xfrm>
-            <a:off x="3903464" y="6415087"/>
+            <a:off x="3903464" y="6407943"/>
             <a:ext cx="4385071" cy="369332"/>
           </a:xfrm>
           <a:prstGeom prst="rect">
@@ -5729,7 +6132,7 @@
     </p:spTree>
     <p:extLst>
       <p:ext uri="{BB962C8B-B14F-4D97-AF65-F5344CB8AC3E}">
-        <p14:creationId xmlns:p14="http://schemas.microsoft.com/office/powerpoint/2010/main" val="1258718855"/>
+        <p14:creationId xmlns:p14="http://schemas.microsoft.com/office/powerpoint/2010/main" val="4101655184"/>
       </p:ext>
     </p:extLst>
   </p:cSld>
@@ -5758,10 +6161,10 @@
       </p:grpSpPr>
       <p:sp>
         <p:nvSpPr>
-          <p:cNvPr id="4" name="Title 3">
-            <a:extLst>
-              <a:ext uri="{FF2B5EF4-FFF2-40B4-BE49-F238E27FC236}">
-                <a16:creationId xmlns:a16="http://schemas.microsoft.com/office/drawing/2014/main" id="{43719644-E9E8-44A4-90D1-6B55870E2B99}"/>
+          <p:cNvPr id="2" name="Title 1">
+            <a:extLst>
+              <a:ext uri="{FF2B5EF4-FFF2-40B4-BE49-F238E27FC236}">
+                <a16:creationId xmlns:a16="http://schemas.microsoft.com/office/drawing/2014/main" id="{7EBA6A92-4528-473D-8018-CF2559DE5245}"/>
               </a:ext>
             </a:extLst>
           </p:cNvPr>
@@ -5779,42 +6182,83 @@
           <a:p>
             <a:r>
               <a:rPr lang="en-GB" dirty="0"/>
-              <a:t>#Requires Demo</a:t>
-            </a:r>
-          </a:p>
-        </p:txBody>
-      </p:sp>
-      <p:sp>
-        <p:nvSpPr>
-          <p:cNvPr id="5" name="Text Placeholder 4">
-            <a:extLst>
-              <a:ext uri="{FF2B5EF4-FFF2-40B4-BE49-F238E27FC236}">
-                <a16:creationId xmlns:a16="http://schemas.microsoft.com/office/drawing/2014/main" id="{95C6CD90-D479-4FA8-9537-0B80D399C76B}"/>
-              </a:ext>
-            </a:extLst>
-          </p:cNvPr>
-          <p:cNvSpPr>
-            <a:spLocks noGrp="1"/>
-          </p:cNvSpPr>
-          <p:nvPr>
-            <p:ph type="body" idx="1"/>
-          </p:nvPr>
-        </p:nvSpPr>
-        <p:spPr/>
-        <p:txBody>
-          <a:bodyPr/>
-          <a:lstStyle/>
-          <a:p>
-            <a:endParaRPr lang="en-GB"/>
-          </a:p>
-        </p:txBody>
-      </p:sp>
-      <p:sp>
-        <p:nvSpPr>
-          <p:cNvPr id="6" name="TextBox 5">
-            <a:extLst>
-              <a:ext uri="{FF2B5EF4-FFF2-40B4-BE49-F238E27FC236}">
-                <a16:creationId xmlns:a16="http://schemas.microsoft.com/office/drawing/2014/main" id="{820F053A-661D-4261-B50A-F2933C8E3963}"/>
+              <a:t>#Requires</a:t>
+            </a:r>
+          </a:p>
+        </p:txBody>
+      </p:sp>
+      <p:sp>
+        <p:nvSpPr>
+          <p:cNvPr id="3" name="Content Placeholder 2">
+            <a:extLst>
+              <a:ext uri="{FF2B5EF4-FFF2-40B4-BE49-F238E27FC236}">
+                <a16:creationId xmlns:a16="http://schemas.microsoft.com/office/drawing/2014/main" id="{F7C775E7-DB41-4B0C-B9CA-EC96CB84F172}"/>
+              </a:ext>
+            </a:extLst>
+          </p:cNvPr>
+          <p:cNvSpPr>
+            <a:spLocks noGrp="1"/>
+          </p:cNvSpPr>
+          <p:nvPr>
+            <p:ph idx="1"/>
+          </p:nvPr>
+        </p:nvSpPr>
+        <p:spPr/>
+        <p:txBody>
+          <a:bodyPr/>
+          <a:lstStyle/>
+          <a:p>
+            <a:r>
+              <a:rPr lang="en-GB" dirty="0"/>
+              <a:t>Must be the first thing on a line</a:t>
+            </a:r>
+          </a:p>
+          <a:p>
+            <a:endParaRPr lang="en-GB" dirty="0"/>
+          </a:p>
+          <a:p>
+            <a:endParaRPr lang="en-GB" dirty="0"/>
+          </a:p>
+          <a:p>
+            <a:r>
+              <a:rPr lang="en-GB" dirty="0"/>
+              <a:t>Usually declared at the top of a script for visibility</a:t>
+            </a:r>
+          </a:p>
+          <a:p>
+            <a:endParaRPr lang="en-GB" dirty="0"/>
+          </a:p>
+          <a:p>
+            <a:endParaRPr lang="en-GB" dirty="0"/>
+          </a:p>
+          <a:p>
+            <a:r>
+              <a:rPr lang="en-GB" dirty="0"/>
+              <a:t>Can be used for Modules, </a:t>
+            </a:r>
+            <a:r>
+              <a:rPr lang="en-GB" dirty="0" err="1"/>
+              <a:t>RunAsAdministrator</a:t>
+            </a:r>
+            <a:r>
+              <a:rPr lang="en-GB" dirty="0"/>
+              <a:t>, Version and more</a:t>
+            </a:r>
+          </a:p>
+          <a:p>
+            <a:endParaRPr lang="en-GB" dirty="0"/>
+          </a:p>
+          <a:p>
+            <a:endParaRPr lang="en-GB" dirty="0"/>
+          </a:p>
+        </p:txBody>
+      </p:sp>
+      <p:sp>
+        <p:nvSpPr>
+          <p:cNvPr id="4" name="TextBox 3">
+            <a:extLst>
+              <a:ext uri="{FF2B5EF4-FFF2-40B4-BE49-F238E27FC236}">
+                <a16:creationId xmlns:a16="http://schemas.microsoft.com/office/drawing/2014/main" id="{D6AC2279-7E42-4E90-9F37-881CA4DB558E}"/>
               </a:ext>
             </a:extLst>
           </p:cNvPr>
@@ -5823,7 +6267,7 @@
         </p:nvSpPr>
         <p:spPr>
           <a:xfrm>
-            <a:off x="3903464" y="6407943"/>
+            <a:off x="3903464" y="6415087"/>
             <a:ext cx="4385071" cy="369332"/>
           </a:xfrm>
           <a:prstGeom prst="rect">
@@ -5871,7 +6315,7 @@
     </p:spTree>
     <p:extLst>
       <p:ext uri="{BB962C8B-B14F-4D97-AF65-F5344CB8AC3E}">
-        <p14:creationId xmlns:p14="http://schemas.microsoft.com/office/powerpoint/2010/main" val="4249416644"/>
+        <p14:creationId xmlns:p14="http://schemas.microsoft.com/office/powerpoint/2010/main" val="1258718855"/>
       </p:ext>
     </p:extLst>
   </p:cSld>
@@ -5900,10 +6344,10 @@
       </p:grpSpPr>
       <p:sp>
         <p:nvSpPr>
-          <p:cNvPr id="2" name="Title 1">
-            <a:extLst>
-              <a:ext uri="{FF2B5EF4-FFF2-40B4-BE49-F238E27FC236}">
-                <a16:creationId xmlns:a16="http://schemas.microsoft.com/office/drawing/2014/main" id="{3C4B4671-C661-4C87-88D4-60F267B132B3}"/>
+          <p:cNvPr id="4" name="Title 3">
+            <a:extLst>
+              <a:ext uri="{FF2B5EF4-FFF2-40B4-BE49-F238E27FC236}">
+                <a16:creationId xmlns:a16="http://schemas.microsoft.com/office/drawing/2014/main" id="{43719644-E9E8-44A4-90D1-6B55870E2B99}"/>
               </a:ext>
             </a:extLst>
           </p:cNvPr>
@@ -5921,72 +6365,42 @@
           <a:p>
             <a:r>
               <a:rPr lang="en-GB" dirty="0"/>
-              <a:t> </a:t>
-            </a:r>
-            <a:r>
-              <a:rPr lang="en-GB" dirty="0" err="1"/>
-              <a:t>RequiredModules</a:t>
-            </a:r>
-            <a:endParaRPr lang="en-GB" dirty="0"/>
-          </a:p>
-        </p:txBody>
-      </p:sp>
-      <p:sp>
-        <p:nvSpPr>
-          <p:cNvPr id="3" name="Content Placeholder 2">
-            <a:extLst>
-              <a:ext uri="{FF2B5EF4-FFF2-40B4-BE49-F238E27FC236}">
-                <a16:creationId xmlns:a16="http://schemas.microsoft.com/office/drawing/2014/main" id="{D562E328-C379-4E43-942B-A88148ADAD8D}"/>
-              </a:ext>
-            </a:extLst>
-          </p:cNvPr>
-          <p:cNvSpPr>
-            <a:spLocks noGrp="1"/>
-          </p:cNvSpPr>
-          <p:nvPr>
-            <p:ph idx="1"/>
-          </p:nvPr>
-        </p:nvSpPr>
-        <p:spPr/>
-        <p:txBody>
-          <a:bodyPr/>
-          <a:lstStyle/>
-          <a:p>
-            <a:r>
-              <a:rPr lang="en-GB" dirty="0"/>
-              <a:t>Declared in the module manifest</a:t>
-            </a:r>
-          </a:p>
-          <a:p>
-            <a:endParaRPr lang="en-GB" dirty="0"/>
-          </a:p>
-          <a:p>
-            <a:r>
-              <a:rPr lang="en-GB" dirty="0"/>
-              <a:t>Either the name, “short” module info, or “long” module info</a:t>
-            </a:r>
-          </a:p>
-          <a:p>
-            <a:endParaRPr lang="en-GB" dirty="0"/>
-          </a:p>
-          <a:p>
-            <a:r>
-              <a:rPr lang="en-GB" dirty="0" err="1"/>
-              <a:t>PowerShellGet</a:t>
-            </a:r>
-            <a:r>
-              <a:rPr lang="en-GB" dirty="0"/>
-              <a:t> will automatically install if not already available</a:t>
-            </a:r>
-          </a:p>
-        </p:txBody>
-      </p:sp>
-      <p:sp>
-        <p:nvSpPr>
-          <p:cNvPr id="4" name="TextBox 3">
-            <a:extLst>
-              <a:ext uri="{FF2B5EF4-FFF2-40B4-BE49-F238E27FC236}">
-                <a16:creationId xmlns:a16="http://schemas.microsoft.com/office/drawing/2014/main" id="{C065E7D1-8A69-490C-949B-AD6E53702A81}"/>
+              <a:t>#Requires Demo</a:t>
+            </a:r>
+          </a:p>
+        </p:txBody>
+      </p:sp>
+      <p:sp>
+        <p:nvSpPr>
+          <p:cNvPr id="5" name="Text Placeholder 4">
+            <a:extLst>
+              <a:ext uri="{FF2B5EF4-FFF2-40B4-BE49-F238E27FC236}">
+                <a16:creationId xmlns:a16="http://schemas.microsoft.com/office/drawing/2014/main" id="{95C6CD90-D479-4FA8-9537-0B80D399C76B}"/>
+              </a:ext>
+            </a:extLst>
+          </p:cNvPr>
+          <p:cNvSpPr>
+            <a:spLocks noGrp="1"/>
+          </p:cNvSpPr>
+          <p:nvPr>
+            <p:ph type="body" idx="1"/>
+          </p:nvPr>
+        </p:nvSpPr>
+        <p:spPr/>
+        <p:txBody>
+          <a:bodyPr/>
+          <a:lstStyle/>
+          <a:p>
+            <a:endParaRPr lang="en-GB"/>
+          </a:p>
+        </p:txBody>
+      </p:sp>
+      <p:sp>
+        <p:nvSpPr>
+          <p:cNvPr id="6" name="TextBox 5">
+            <a:extLst>
+              <a:ext uri="{FF2B5EF4-FFF2-40B4-BE49-F238E27FC236}">
+                <a16:creationId xmlns:a16="http://schemas.microsoft.com/office/drawing/2014/main" id="{820F053A-661D-4261-B50A-F2933C8E3963}"/>
               </a:ext>
             </a:extLst>
           </p:cNvPr>
@@ -6043,7 +6457,7 @@
     </p:spTree>
     <p:extLst>
       <p:ext uri="{BB962C8B-B14F-4D97-AF65-F5344CB8AC3E}">
-        <p14:creationId xmlns:p14="http://schemas.microsoft.com/office/powerpoint/2010/main" val="4078746266"/>
+        <p14:creationId xmlns:p14="http://schemas.microsoft.com/office/powerpoint/2010/main" val="4249416644"/>
       </p:ext>
     </p:extLst>
   </p:cSld>
@@ -6072,10 +6486,10 @@
       </p:grpSpPr>
       <p:sp>
         <p:nvSpPr>
-          <p:cNvPr id="4" name="Title 3">
-            <a:extLst>
-              <a:ext uri="{FF2B5EF4-FFF2-40B4-BE49-F238E27FC236}">
-                <a16:creationId xmlns:a16="http://schemas.microsoft.com/office/drawing/2014/main" id="{4AA6EF36-62BF-465E-91C9-2431157E7E22}"/>
+          <p:cNvPr id="2" name="Title 1">
+            <a:extLst>
+              <a:ext uri="{FF2B5EF4-FFF2-40B4-BE49-F238E27FC236}">
+                <a16:creationId xmlns:a16="http://schemas.microsoft.com/office/drawing/2014/main" id="{3C4B4671-C661-4C87-88D4-60F267B132B3}"/>
               </a:ext>
             </a:extLst>
           </p:cNvPr>
@@ -6091,48 +6505,80 @@
           <a:bodyPr/>
           <a:lstStyle/>
           <a:p>
+            <a:r>
+              <a:rPr lang="en-GB" dirty="0"/>
+              <a:t> </a:t>
+            </a:r>
             <a:r>
               <a:rPr lang="en-GB" dirty="0" err="1"/>
               <a:t>RequiredModules</a:t>
             </a:r>
-            <a:r>
-              <a:rPr lang="en-GB" dirty="0"/>
-              <a:t> Demo</a:t>
-            </a:r>
-          </a:p>
-        </p:txBody>
-      </p:sp>
-      <p:sp>
-        <p:nvSpPr>
-          <p:cNvPr id="5" name="Text Placeholder 4">
-            <a:extLst>
-              <a:ext uri="{FF2B5EF4-FFF2-40B4-BE49-F238E27FC236}">
-                <a16:creationId xmlns:a16="http://schemas.microsoft.com/office/drawing/2014/main" id="{0E40BEAC-AF12-4147-8076-B4DF743DCF8A}"/>
-              </a:ext>
-            </a:extLst>
-          </p:cNvPr>
-          <p:cNvSpPr>
-            <a:spLocks noGrp="1"/>
-          </p:cNvSpPr>
-          <p:nvPr>
-            <p:ph type="body" idx="1"/>
-          </p:nvPr>
-        </p:nvSpPr>
-        <p:spPr/>
-        <p:txBody>
-          <a:bodyPr/>
-          <a:lstStyle/>
-          <a:p>
-            <a:endParaRPr lang="en-GB"/>
-          </a:p>
-        </p:txBody>
-      </p:sp>
-      <p:sp>
-        <p:nvSpPr>
-          <p:cNvPr id="6" name="TextBox 5">
-            <a:extLst>
-              <a:ext uri="{FF2B5EF4-FFF2-40B4-BE49-F238E27FC236}">
-                <a16:creationId xmlns:a16="http://schemas.microsoft.com/office/drawing/2014/main" id="{1A5276C6-9508-496D-8311-558C61622E66}"/>
+            <a:endParaRPr lang="en-GB" dirty="0"/>
+          </a:p>
+        </p:txBody>
+      </p:sp>
+      <p:sp>
+        <p:nvSpPr>
+          <p:cNvPr id="3" name="Content Placeholder 2">
+            <a:extLst>
+              <a:ext uri="{FF2B5EF4-FFF2-40B4-BE49-F238E27FC236}">
+                <a16:creationId xmlns:a16="http://schemas.microsoft.com/office/drawing/2014/main" id="{D562E328-C379-4E43-942B-A88148ADAD8D}"/>
+              </a:ext>
+            </a:extLst>
+          </p:cNvPr>
+          <p:cNvSpPr>
+            <a:spLocks noGrp="1"/>
+          </p:cNvSpPr>
+          <p:nvPr>
+            <p:ph idx="1"/>
+          </p:nvPr>
+        </p:nvSpPr>
+        <p:spPr/>
+        <p:txBody>
+          <a:bodyPr/>
+          <a:lstStyle/>
+          <a:p>
+            <a:r>
+              <a:rPr lang="en-GB" dirty="0"/>
+              <a:t>Declared in the module manifest</a:t>
+            </a:r>
+          </a:p>
+          <a:p>
+            <a:endParaRPr lang="en-GB" dirty="0"/>
+          </a:p>
+          <a:p>
+            <a:endParaRPr lang="en-GB" dirty="0"/>
+          </a:p>
+          <a:p>
+            <a:r>
+              <a:rPr lang="en-GB" dirty="0"/>
+              <a:t>Either the name, “short” module info, or “long” module info</a:t>
+            </a:r>
+          </a:p>
+          <a:p>
+            <a:endParaRPr lang="en-GB" dirty="0"/>
+          </a:p>
+          <a:p>
+            <a:endParaRPr lang="en-GB" dirty="0"/>
+          </a:p>
+          <a:p>
+            <a:r>
+              <a:rPr lang="en-GB" dirty="0" err="1"/>
+              <a:t>PowerShellGet</a:t>
+            </a:r>
+            <a:r>
+              <a:rPr lang="en-GB" dirty="0"/>
+              <a:t> will automatically install if not already available</a:t>
+            </a:r>
+          </a:p>
+        </p:txBody>
+      </p:sp>
+      <p:sp>
+        <p:nvSpPr>
+          <p:cNvPr id="4" name="TextBox 3">
+            <a:extLst>
+              <a:ext uri="{FF2B5EF4-FFF2-40B4-BE49-F238E27FC236}">
+                <a16:creationId xmlns:a16="http://schemas.microsoft.com/office/drawing/2014/main" id="{C065E7D1-8A69-490C-949B-AD6E53702A81}"/>
               </a:ext>
             </a:extLst>
           </p:cNvPr>
@@ -6189,7 +6635,7 @@
     </p:spTree>
     <p:extLst>
       <p:ext uri="{BB962C8B-B14F-4D97-AF65-F5344CB8AC3E}">
-        <p14:creationId xmlns:p14="http://schemas.microsoft.com/office/powerpoint/2010/main" val="94953113"/>
+        <p14:creationId xmlns:p14="http://schemas.microsoft.com/office/powerpoint/2010/main" val="4078746266"/>
       </p:ext>
     </p:extLst>
   </p:cSld>
@@ -6218,10 +6664,10 @@
       </p:grpSpPr>
       <p:sp>
         <p:nvSpPr>
-          <p:cNvPr id="2" name="Title 1">
-            <a:extLst>
-              <a:ext uri="{FF2B5EF4-FFF2-40B4-BE49-F238E27FC236}">
-                <a16:creationId xmlns:a16="http://schemas.microsoft.com/office/drawing/2014/main" id="{0C6709AC-94A8-40C8-A8F7-7C00BE0EAE47}"/>
+          <p:cNvPr id="4" name="Title 3">
+            <a:extLst>
+              <a:ext uri="{FF2B5EF4-FFF2-40B4-BE49-F238E27FC236}">
+                <a16:creationId xmlns:a16="http://schemas.microsoft.com/office/drawing/2014/main" id="{4AA6EF36-62BF-465E-91C9-2431157E7E22}"/>
               </a:ext>
             </a:extLst>
           </p:cNvPr>
@@ -6238,55 +6684,47 @@
           <a:lstStyle/>
           <a:p>
             <a:r>
-              <a:rPr lang="en-GB" dirty="0"/>
-              <a:t>Dependency Types</a:t>
-            </a:r>
-          </a:p>
-        </p:txBody>
-      </p:sp>
-      <p:sp>
-        <p:nvSpPr>
-          <p:cNvPr id="3" name="Content Placeholder 2">
-            <a:extLst>
-              <a:ext uri="{FF2B5EF4-FFF2-40B4-BE49-F238E27FC236}">
-                <a16:creationId xmlns:a16="http://schemas.microsoft.com/office/drawing/2014/main" id="{69DC5609-04D2-4E77-8FBC-2B95AB165047}"/>
-              </a:ext>
-            </a:extLst>
-          </p:cNvPr>
-          <p:cNvSpPr>
-            <a:spLocks noGrp="1"/>
-          </p:cNvSpPr>
-          <p:nvPr>
-            <p:ph idx="1"/>
-          </p:nvPr>
-        </p:nvSpPr>
-        <p:spPr/>
-        <p:txBody>
-          <a:bodyPr/>
-          <a:lstStyle/>
-          <a:p>
-            <a:r>
-              <a:rPr lang="en-GB" dirty="0"/>
-              <a:t>Runtime dependencies</a:t>
-            </a:r>
-          </a:p>
-          <a:p>
-            <a:endParaRPr lang="en-GB" dirty="0"/>
-          </a:p>
-          <a:p>
-            <a:r>
-              <a:rPr lang="en-GB" dirty="0"/>
-              <a:t>Build dependencies</a:t>
-            </a:r>
-          </a:p>
-        </p:txBody>
-      </p:sp>
-      <p:sp>
-        <p:nvSpPr>
-          <p:cNvPr id="4" name="TextBox 3">
-            <a:extLst>
-              <a:ext uri="{FF2B5EF4-FFF2-40B4-BE49-F238E27FC236}">
-                <a16:creationId xmlns:a16="http://schemas.microsoft.com/office/drawing/2014/main" id="{F4F6AFB8-3821-44B6-809A-235D8A93335B}"/>
+              <a:rPr lang="en-GB" dirty="0" err="1"/>
+              <a:t>RequiredModules</a:t>
+            </a:r>
+            <a:r>
+              <a:rPr lang="en-GB" dirty="0"/>
+              <a:t> Demo</a:t>
+            </a:r>
+          </a:p>
+        </p:txBody>
+      </p:sp>
+      <p:sp>
+        <p:nvSpPr>
+          <p:cNvPr id="5" name="Text Placeholder 4">
+            <a:extLst>
+              <a:ext uri="{FF2B5EF4-FFF2-40B4-BE49-F238E27FC236}">
+                <a16:creationId xmlns:a16="http://schemas.microsoft.com/office/drawing/2014/main" id="{0E40BEAC-AF12-4147-8076-B4DF743DCF8A}"/>
+              </a:ext>
+            </a:extLst>
+          </p:cNvPr>
+          <p:cNvSpPr>
+            <a:spLocks noGrp="1"/>
+          </p:cNvSpPr>
+          <p:nvPr>
+            <p:ph type="body" idx="1"/>
+          </p:nvPr>
+        </p:nvSpPr>
+        <p:spPr/>
+        <p:txBody>
+          <a:bodyPr/>
+          <a:lstStyle/>
+          <a:p>
+            <a:endParaRPr lang="en-GB"/>
+          </a:p>
+        </p:txBody>
+      </p:sp>
+      <p:sp>
+        <p:nvSpPr>
+          <p:cNvPr id="6" name="TextBox 5">
+            <a:extLst>
+              <a:ext uri="{FF2B5EF4-FFF2-40B4-BE49-F238E27FC236}">
+                <a16:creationId xmlns:a16="http://schemas.microsoft.com/office/drawing/2014/main" id="{1A5276C6-9508-496D-8311-558C61622E66}"/>
               </a:ext>
             </a:extLst>
           </p:cNvPr>
@@ -6343,7 +6781,7 @@
     </p:spTree>
     <p:extLst>
       <p:ext uri="{BB962C8B-B14F-4D97-AF65-F5344CB8AC3E}">
-        <p14:creationId xmlns:p14="http://schemas.microsoft.com/office/powerpoint/2010/main" val="4101655184"/>
+        <p14:creationId xmlns:p14="http://schemas.microsoft.com/office/powerpoint/2010/main" val="94953113"/>
       </p:ext>
     </p:extLst>
   </p:cSld>

</xml_diff>

<commit_message>
Add examples of the various uses of requirements
</commit_message>
<xml_diff>
--- a/lean-on-me/Lean on me.pptx
+++ b/lean-on-me/Lean on me.pptx
@@ -5,7 +5,7 @@
     <p:sldMasterId id="2147483648" r:id="rId1"/>
   </p:sldMasterIdLst>
   <p:notesMasterIdLst>
-    <p:notesMasterId r:id="rId14"/>
+    <p:notesMasterId r:id="rId15"/>
   </p:notesMasterIdLst>
   <p:sldIdLst>
     <p:sldId id="256" r:id="rId2"/>
@@ -15,11 +15,12 @@
     <p:sldId id="261" r:id="rId6"/>
     <p:sldId id="257" r:id="rId7"/>
     <p:sldId id="264" r:id="rId8"/>
-    <p:sldId id="258" r:id="rId9"/>
-    <p:sldId id="265" r:id="rId10"/>
-    <p:sldId id="259" r:id="rId11"/>
-    <p:sldId id="266" r:id="rId12"/>
-    <p:sldId id="268" r:id="rId13"/>
+    <p:sldId id="269" r:id="rId9"/>
+    <p:sldId id="258" r:id="rId10"/>
+    <p:sldId id="265" r:id="rId11"/>
+    <p:sldId id="259" r:id="rId12"/>
+    <p:sldId id="266" r:id="rId13"/>
+    <p:sldId id="268" r:id="rId14"/>
   </p:sldIdLst>
   <p:sldSz cx="12192000" cy="6858000"/>
   <p:notesSz cx="6858000" cy="9144000"/>
@@ -208,7 +209,7 @@
           <a:p>
             <a:fld id="{5B32551C-E125-462F-8842-2149E658536A}" type="datetimeFigureOut">
               <a:rPr lang="en-GB" smtClean="0"/>
-              <a:t>14/05/2019</a:t>
+              <a:t>22/05/2019</a:t>
             </a:fld>
             <a:endParaRPr lang="en-GB"/>
           </a:p>
@@ -1251,26 +1252,52 @@
           <a:bodyPr/>
           <a:lstStyle/>
           <a:p>
-            <a:r>
-              <a:rPr lang="en-GB" dirty="0"/>
-              <a:t>This should be your main choice when detailing what your module requires to run. This is true of any requirement you have for a module that you’d consider using #requires for in a script except </a:t>
-            </a:r>
-            <a:r>
-              <a:rPr lang="en-GB" dirty="0" err="1"/>
-              <a:t>RunAsAdministrator</a:t>
-            </a:r>
-            <a:r>
-              <a:rPr lang="en-GB" dirty="0"/>
-              <a:t>.</a:t>
+            <a:pPr marL="0" marR="0" lvl="0" indent="0" algn="l" defTabSz="914400" rtl="0" eaLnBrk="1" fontAlgn="auto" latinLnBrk="0" hangingPunct="1">
+              <a:lnSpc>
+                <a:spcPct val="100000"/>
+              </a:lnSpc>
+              <a:spcBef>
+                <a:spcPts val="0"/>
+              </a:spcBef>
+              <a:spcAft>
+                <a:spcPts val="0"/>
+              </a:spcAft>
+              <a:buClrTx/>
+              <a:buSzTx/>
+              <a:buFontTx/>
+              <a:buNone/>
+              <a:tabLst/>
+              <a:defRPr/>
+            </a:pPr>
+            <a:r>
+              <a:rPr lang="en-GB" dirty="0"/>
+              <a:t>If your module doesn’t have a manifest then I’d strongly recommend creating one. It’ll allow you to handle a lot of metadata about your module, let you publish it to the public gallery or a private one, and let you handle dependencies like this.</a:t>
             </a:r>
           </a:p>
           <a:p>
             <a:endParaRPr lang="en-GB" dirty="0"/>
           </a:p>
           <a:p>
-            <a:r>
-              <a:rPr lang="en-GB" dirty="0"/>
-              <a:t>If your module doesn’t have a manifest then I’d strongly recommend creating one. It’ll allow you to handle a lot of metadata about your module, let you publish it to the public gallery or a private one, and let you handle dependencies like this.</a:t>
+            <a:pPr marL="0" marR="0" lvl="0" indent="0" algn="l" defTabSz="914400" rtl="0" eaLnBrk="1" fontAlgn="auto" latinLnBrk="0" hangingPunct="1">
+              <a:lnSpc>
+                <a:spcPct val="100000"/>
+              </a:lnSpc>
+              <a:spcBef>
+                <a:spcPts val="0"/>
+              </a:spcBef>
+              <a:spcAft>
+                <a:spcPts val="0"/>
+              </a:spcAft>
+              <a:buClrTx/>
+              <a:buSzTx/>
+              <a:buFontTx/>
+              <a:buNone/>
+              <a:tabLst/>
+              <a:defRPr/>
+            </a:pPr>
+            <a:r>
+              <a:rPr lang="en-GB" dirty="0"/>
+              <a:t>Can specify required modules, assemblies, version, host, framework version and more.</a:t>
             </a:r>
           </a:p>
           <a:p>
@@ -1279,7 +1306,7 @@
           <a:p>
             <a:r>
               <a:rPr lang="en-GB" dirty="0"/>
-              <a:t>The three formats for defining required modules are just the name, the name and module version (or required version), and the name, version and GUID. Be as explicit as you need to be, I stick with name and version but environments with more strict security requirements should also use the GUID to ensure it’s the same module.</a:t>
+              <a:t>Name and casing should match the module folder exactly. We’re in a cross platform world now and *nix is case sensitive.</a:t>
             </a:r>
           </a:p>
           <a:p>
@@ -1287,20 +1314,8 @@
           </a:p>
           <a:p>
             <a:r>
-              <a:rPr lang="en-GB" dirty="0" err="1"/>
-              <a:t>PowerShellGet</a:t>
-            </a:r>
-            <a:r>
-              <a:rPr lang="en-GB" dirty="0"/>
-              <a:t> will read the </a:t>
-            </a:r>
-            <a:r>
-              <a:rPr lang="en-GB" dirty="0" err="1"/>
-              <a:t>RequiredModules</a:t>
-            </a:r>
-            <a:r>
-              <a:rPr lang="en-GB" dirty="0"/>
-              <a:t> and install it where it can. I believe it prioritises the same repository as it’s pulling this module from but should look to other repositories if the dependencies aren’t available there.</a:t>
+              <a:rPr lang="en-GB" dirty="0"/>
+              <a:t>You can combine #requires with a module manifest but you should favour using the manifest versions of requirements over the #requires methods where possible.</a:t>
             </a:r>
           </a:p>
         </p:txBody>
@@ -1331,7 +1346,7 @@
     </p:spTree>
     <p:extLst>
       <p:ext uri="{BB962C8B-B14F-4D97-AF65-F5344CB8AC3E}">
-        <p14:creationId xmlns:p14="http://schemas.microsoft.com/office/powerpoint/2010/main" val="3160020979"/>
+        <p14:creationId xmlns:p14="http://schemas.microsoft.com/office/powerpoint/2010/main" val="3465769950"/>
       </p:ext>
     </p:extLst>
   </p:cSld>
@@ -1387,32 +1402,37 @@
           <a:p>
             <a:r>
               <a:rPr lang="en-GB" dirty="0"/>
-              <a:t>A very useful module from Warren Frame (</a:t>
-            </a:r>
+              <a:t>This should be your main choice when detailing what your module requires to run. </a:t>
+            </a:r>
+          </a:p>
+          <a:p>
+            <a:endParaRPr lang="en-GB" dirty="0"/>
+          </a:p>
+          <a:p>
+            <a:r>
+              <a:rPr lang="en-GB" dirty="0"/>
+              <a:t>The three formats for defining required modules are just the name, the name and module version (or required version), and the name, version and GUID. Be as explicit as you need to be, I stick with name and version but environments with more strict security requirements should also use the GUID to ensure it’s the same module.</a:t>
+            </a:r>
+          </a:p>
+          <a:p>
+            <a:endParaRPr lang="en-GB" dirty="0"/>
+          </a:p>
+          <a:p>
             <a:r>
               <a:rPr lang="en-GB" dirty="0" err="1"/>
-              <a:t>RamblingCookieMonster</a:t>
-            </a:r>
-            <a:r>
-              <a:rPr lang="en-GB" dirty="0"/>
-              <a:t>/</a:t>
+              <a:t>PowerShellGet</a:t>
+            </a:r>
+            <a:r>
+              <a:rPr lang="en-GB" dirty="0"/>
+              <a:t> will read the </a:t>
             </a:r>
             <a:r>
               <a:rPr lang="en-GB" dirty="0" err="1"/>
-              <a:t>PSCookieMonster</a:t>
-            </a:r>
-            <a:r>
-              <a:rPr lang="en-GB" dirty="0"/>
-              <a:t>) that helps manage the dependencies your module has and track those as the code evolves. It works best if you’re using source control (please be using source control) and a CI pipeline but neither is required to use the module. </a:t>
-            </a:r>
-          </a:p>
-          <a:p>
-            <a:endParaRPr lang="en-GB" dirty="0"/>
-          </a:p>
-          <a:p>
-            <a:r>
-              <a:rPr lang="en-GB" dirty="0"/>
-              <a:t>My main use of it is to ensure all my build time dependencies are there for my CI pipeline (and local builds). It can handle more than just modules as well, it’ll handle normal </a:t>
+              <a:t>RequiredModules</a:t>
+            </a:r>
+            <a:r>
+              <a:rPr lang="en-GB" dirty="0"/>
+              <a:t> and install it where it can. It can’t install across repositories so you may need to install required modules first or make use of pass through on your private </a:t>
             </a:r>
             <a:r>
               <a:rPr lang="en-GB" dirty="0" err="1"/>
@@ -1420,46 +1440,7 @@
             </a:r>
             <a:r>
               <a:rPr lang="en-GB" dirty="0"/>
-              <a:t> packages, </a:t>
-            </a:r>
-            <a:r>
-              <a:rPr lang="en-GB" dirty="0" err="1"/>
-              <a:t>github</a:t>
-            </a:r>
-            <a:r>
-              <a:rPr lang="en-GB" dirty="0"/>
-              <a:t> repos (or any old git repo), </a:t>
-            </a:r>
-            <a:r>
-              <a:rPr lang="en-GB" dirty="0" err="1"/>
-              <a:t>npm</a:t>
-            </a:r>
-            <a:r>
-              <a:rPr lang="en-GB" dirty="0"/>
-              <a:t> and more. Get-</a:t>
-            </a:r>
-            <a:r>
-              <a:rPr lang="en-GB" dirty="0" err="1"/>
-              <a:t>PSDependType</a:t>
-            </a:r>
-            <a:r>
-              <a:rPr lang="en-GB" dirty="0"/>
-              <a:t> will list them all out along with descriptions. It’s also very extensible if there is another type of dependency you want to handle with it (and PR it back to the module if possible).</a:t>
-            </a:r>
-          </a:p>
-          <a:p>
-            <a:endParaRPr lang="en-GB" dirty="0"/>
-          </a:p>
-          <a:p>
-            <a:endParaRPr lang="en-GB" dirty="0"/>
-          </a:p>
-          <a:p>
-            <a:endParaRPr lang="en-GB" dirty="0"/>
-          </a:p>
-          <a:p>
-            <a:r>
-              <a:rPr lang="en-GB" dirty="0"/>
-              <a:t>https://github.com/RamblingCookieMonster/PSDepend</a:t>
+              <a:t> feed.</a:t>
             </a:r>
           </a:p>
         </p:txBody>
@@ -1481,7 +1462,7 @@
           <a:p>
             <a:fld id="{0B5B1F1C-CD78-43C3-8BF1-558E51F83C81}" type="slidenum">
               <a:rPr lang="en-GB" smtClean="0"/>
-              <a:t>10</a:t>
+              <a:t>9</a:t>
             </a:fld>
             <a:endParaRPr lang="en-GB"/>
           </a:p>
@@ -1490,7 +1471,7 @@
     </p:spTree>
     <p:extLst>
       <p:ext uri="{BB962C8B-B14F-4D97-AF65-F5344CB8AC3E}">
-        <p14:creationId xmlns:p14="http://schemas.microsoft.com/office/powerpoint/2010/main" val="454638995"/>
+        <p14:creationId xmlns:p14="http://schemas.microsoft.com/office/powerpoint/2010/main" val="3160020979"/>
       </p:ext>
     </p:extLst>
   </p:cSld>
@@ -1544,7 +1525,82 @@
           <a:bodyPr/>
           <a:lstStyle/>
           <a:p>
+            <a:r>
+              <a:rPr lang="en-GB" dirty="0"/>
+              <a:t>A very useful module from Warren Frame (</a:t>
+            </a:r>
+            <a:r>
+              <a:rPr lang="en-GB" dirty="0" err="1"/>
+              <a:t>RamblingCookieMonster</a:t>
+            </a:r>
+            <a:r>
+              <a:rPr lang="en-GB" dirty="0"/>
+              <a:t>/</a:t>
+            </a:r>
+            <a:r>
+              <a:rPr lang="en-GB" dirty="0" err="1"/>
+              <a:t>PSCookieMonster</a:t>
+            </a:r>
+            <a:r>
+              <a:rPr lang="en-GB" dirty="0"/>
+              <a:t>) that helps manage the dependencies your module has and track those as the code evolves. It works best if you’re using source control (please be using source control) and a CI pipeline but neither is required to use the module. </a:t>
+            </a:r>
+          </a:p>
+          <a:p>
             <a:endParaRPr lang="en-GB" dirty="0"/>
+          </a:p>
+          <a:p>
+            <a:r>
+              <a:rPr lang="en-GB" dirty="0"/>
+              <a:t>My main use of it is to ensure all my build time dependencies are there for my CI pipeline (and local builds). It can handle more than just modules as well, it’ll handle normal </a:t>
+            </a:r>
+            <a:r>
+              <a:rPr lang="en-GB" dirty="0" err="1"/>
+              <a:t>nuget</a:t>
+            </a:r>
+            <a:r>
+              <a:rPr lang="en-GB" dirty="0"/>
+              <a:t> packages, </a:t>
+            </a:r>
+            <a:r>
+              <a:rPr lang="en-GB" dirty="0" err="1"/>
+              <a:t>github</a:t>
+            </a:r>
+            <a:r>
+              <a:rPr lang="en-GB" dirty="0"/>
+              <a:t> repos (or any old git repo), </a:t>
+            </a:r>
+            <a:r>
+              <a:rPr lang="en-GB" dirty="0" err="1"/>
+              <a:t>npm</a:t>
+            </a:r>
+            <a:r>
+              <a:rPr lang="en-GB" dirty="0"/>
+              <a:t> and more. Get-</a:t>
+            </a:r>
+            <a:r>
+              <a:rPr lang="en-GB" dirty="0" err="1"/>
+              <a:t>PSDependType</a:t>
+            </a:r>
+            <a:r>
+              <a:rPr lang="en-GB" dirty="0"/>
+              <a:t> will list them all out along with descriptions. It’s also very extensible if there is another type of dependency you want to handle with it (and PR it back to the module if possible).</a:t>
+            </a:r>
+          </a:p>
+          <a:p>
+            <a:endParaRPr lang="en-GB" dirty="0"/>
+          </a:p>
+          <a:p>
+            <a:endParaRPr lang="en-GB" dirty="0"/>
+          </a:p>
+          <a:p>
+            <a:endParaRPr lang="en-GB" dirty="0"/>
+          </a:p>
+          <a:p>
+            <a:r>
+              <a:rPr lang="en-GB" dirty="0"/>
+              <a:t>https://github.com/RamblingCookieMonster/PSDepend</a:t>
+            </a:r>
           </a:p>
         </p:txBody>
       </p:sp>
@@ -1565,7 +1621,91 @@
           <a:p>
             <a:fld id="{0B5B1F1C-CD78-43C3-8BF1-558E51F83C81}" type="slidenum">
               <a:rPr lang="en-GB" smtClean="0"/>
-              <a:t>12</a:t>
+              <a:t>11</a:t>
+            </a:fld>
+            <a:endParaRPr lang="en-GB"/>
+          </a:p>
+        </p:txBody>
+      </p:sp>
+    </p:spTree>
+    <p:extLst>
+      <p:ext uri="{BB962C8B-B14F-4D97-AF65-F5344CB8AC3E}">
+        <p14:creationId xmlns:p14="http://schemas.microsoft.com/office/powerpoint/2010/main" val="454638995"/>
+      </p:ext>
+    </p:extLst>
+  </p:cSld>
+  <p:clrMapOvr>
+    <a:masterClrMapping/>
+  </p:clrMapOvr>
+</p:notes>
+</file>
+
+<file path=ppt/notesSlides/notesSlide9.xml><?xml version="1.0" encoding="utf-8"?>
+<p:notes xmlns:a="http://schemas.openxmlformats.org/drawingml/2006/main" xmlns:r="http://schemas.openxmlformats.org/officeDocument/2006/relationships" xmlns:p="http://schemas.openxmlformats.org/presentationml/2006/main">
+  <p:cSld>
+    <p:spTree>
+      <p:nvGrpSpPr>
+        <p:cNvPr id="1" name=""/>
+        <p:cNvGrpSpPr/>
+        <p:nvPr/>
+      </p:nvGrpSpPr>
+      <p:grpSpPr>
+        <a:xfrm>
+          <a:off x="0" y="0"/>
+          <a:ext cx="0" cy="0"/>
+          <a:chOff x="0" y="0"/>
+          <a:chExt cx="0" cy="0"/>
+        </a:xfrm>
+      </p:grpSpPr>
+      <p:sp>
+        <p:nvSpPr>
+          <p:cNvPr id="2" name="Slide Image Placeholder 1"/>
+          <p:cNvSpPr>
+            <a:spLocks noGrp="1" noRot="1" noChangeAspect="1"/>
+          </p:cNvSpPr>
+          <p:nvPr>
+            <p:ph type="sldImg"/>
+          </p:nvPr>
+        </p:nvSpPr>
+        <p:spPr/>
+      </p:sp>
+      <p:sp>
+        <p:nvSpPr>
+          <p:cNvPr id="3" name="Notes Placeholder 2"/>
+          <p:cNvSpPr>
+            <a:spLocks noGrp="1"/>
+          </p:cNvSpPr>
+          <p:nvPr>
+            <p:ph type="body" idx="1"/>
+          </p:nvPr>
+        </p:nvSpPr>
+        <p:spPr/>
+        <p:txBody>
+          <a:bodyPr/>
+          <a:lstStyle/>
+          <a:p>
+            <a:endParaRPr lang="en-GB" dirty="0"/>
+          </a:p>
+        </p:txBody>
+      </p:sp>
+      <p:sp>
+        <p:nvSpPr>
+          <p:cNvPr id="4" name="Slide Number Placeholder 3"/>
+          <p:cNvSpPr>
+            <a:spLocks noGrp="1"/>
+          </p:cNvSpPr>
+          <p:nvPr>
+            <p:ph type="sldNum" sz="quarter" idx="5"/>
+          </p:nvPr>
+        </p:nvSpPr>
+        <p:spPr/>
+        <p:txBody>
+          <a:bodyPr/>
+          <a:lstStyle/>
+          <a:p>
+            <a:fld id="{0B5B1F1C-CD78-43C3-8BF1-558E51F83C81}" type="slidenum">
+              <a:rPr lang="en-GB" smtClean="0"/>
+              <a:t>13</a:t>
             </a:fld>
             <a:endParaRPr lang="en-GB"/>
           </a:p>
@@ -1733,7 +1873,7 @@
           <a:p>
             <a:fld id="{42B366DA-0315-4031-8173-03CBA2F90823}" type="datetimeFigureOut">
               <a:rPr lang="en-GB" smtClean="0"/>
-              <a:t>14/05/2019</a:t>
+              <a:t>22/05/2019</a:t>
             </a:fld>
             <a:endParaRPr lang="en-GB"/>
           </a:p>
@@ -1933,7 +2073,7 @@
           <a:p>
             <a:fld id="{42B366DA-0315-4031-8173-03CBA2F90823}" type="datetimeFigureOut">
               <a:rPr lang="en-GB" smtClean="0"/>
-              <a:t>14/05/2019</a:t>
+              <a:t>22/05/2019</a:t>
             </a:fld>
             <a:endParaRPr lang="en-GB"/>
           </a:p>
@@ -2143,7 +2283,7 @@
           <a:p>
             <a:fld id="{42B366DA-0315-4031-8173-03CBA2F90823}" type="datetimeFigureOut">
               <a:rPr lang="en-GB" smtClean="0"/>
-              <a:t>14/05/2019</a:t>
+              <a:t>22/05/2019</a:t>
             </a:fld>
             <a:endParaRPr lang="en-GB"/>
           </a:p>
@@ -2343,7 +2483,7 @@
           <a:p>
             <a:fld id="{42B366DA-0315-4031-8173-03CBA2F90823}" type="datetimeFigureOut">
               <a:rPr lang="en-GB" smtClean="0"/>
-              <a:t>14/05/2019</a:t>
+              <a:t>22/05/2019</a:t>
             </a:fld>
             <a:endParaRPr lang="en-GB"/>
           </a:p>
@@ -2619,7 +2759,7 @@
           <a:p>
             <a:fld id="{42B366DA-0315-4031-8173-03CBA2F90823}" type="datetimeFigureOut">
               <a:rPr lang="en-GB" smtClean="0"/>
-              <a:t>14/05/2019</a:t>
+              <a:t>22/05/2019</a:t>
             </a:fld>
             <a:endParaRPr lang="en-GB"/>
           </a:p>
@@ -2887,7 +3027,7 @@
           <a:p>
             <a:fld id="{42B366DA-0315-4031-8173-03CBA2F90823}" type="datetimeFigureOut">
               <a:rPr lang="en-GB" smtClean="0"/>
-              <a:t>14/05/2019</a:t>
+              <a:t>22/05/2019</a:t>
             </a:fld>
             <a:endParaRPr lang="en-GB"/>
           </a:p>
@@ -3302,7 +3442,7 @@
           <a:p>
             <a:fld id="{42B366DA-0315-4031-8173-03CBA2F90823}" type="datetimeFigureOut">
               <a:rPr lang="en-GB" smtClean="0"/>
-              <a:t>14/05/2019</a:t>
+              <a:t>22/05/2019</a:t>
             </a:fld>
             <a:endParaRPr lang="en-GB"/>
           </a:p>
@@ -3444,7 +3584,7 @@
           <a:p>
             <a:fld id="{42B366DA-0315-4031-8173-03CBA2F90823}" type="datetimeFigureOut">
               <a:rPr lang="en-GB" smtClean="0"/>
-              <a:t>14/05/2019</a:t>
+              <a:t>22/05/2019</a:t>
             </a:fld>
             <a:endParaRPr lang="en-GB"/>
           </a:p>
@@ -3557,7 +3697,7 @@
           <a:p>
             <a:fld id="{42B366DA-0315-4031-8173-03CBA2F90823}" type="datetimeFigureOut">
               <a:rPr lang="en-GB" smtClean="0"/>
-              <a:t>14/05/2019</a:t>
+              <a:t>22/05/2019</a:t>
             </a:fld>
             <a:endParaRPr lang="en-GB"/>
           </a:p>
@@ -3870,7 +4010,7 @@
           <a:p>
             <a:fld id="{42B366DA-0315-4031-8173-03CBA2F90823}" type="datetimeFigureOut">
               <a:rPr lang="en-GB" smtClean="0"/>
-              <a:t>14/05/2019</a:t>
+              <a:t>22/05/2019</a:t>
             </a:fld>
             <a:endParaRPr lang="en-GB"/>
           </a:p>
@@ -4159,7 +4299,7 @@
           <a:p>
             <a:fld id="{42B366DA-0315-4031-8173-03CBA2F90823}" type="datetimeFigureOut">
               <a:rPr lang="en-GB" smtClean="0"/>
-              <a:t>14/05/2019</a:t>
+              <a:t>22/05/2019</a:t>
             </a:fld>
             <a:endParaRPr lang="en-GB"/>
           </a:p>
@@ -4402,7 +4542,7 @@
           <a:p>
             <a:fld id="{42B366DA-0315-4031-8173-03CBA2F90823}" type="datetimeFigureOut">
               <a:rPr lang="en-GB" smtClean="0"/>
-              <a:t>14/05/2019</a:t>
+              <a:t>22/05/2019</a:t>
             </a:fld>
             <a:endParaRPr lang="en-GB"/>
           </a:p>
@@ -4966,10 +5106,10 @@
       </p:grpSpPr>
       <p:sp>
         <p:nvSpPr>
-          <p:cNvPr id="2" name="Title 1">
-            <a:extLst>
-              <a:ext uri="{FF2B5EF4-FFF2-40B4-BE49-F238E27FC236}">
-                <a16:creationId xmlns:a16="http://schemas.microsoft.com/office/drawing/2014/main" id="{A4C1C9DC-98E4-4376-9FBD-5B69C9A23C1B}"/>
+          <p:cNvPr id="4" name="Title 3">
+            <a:extLst>
+              <a:ext uri="{FF2B5EF4-FFF2-40B4-BE49-F238E27FC236}">
+                <a16:creationId xmlns:a16="http://schemas.microsoft.com/office/drawing/2014/main" id="{4AA6EF36-62BF-465E-91C9-2431157E7E22}"/>
               </a:ext>
             </a:extLst>
           </p:cNvPr>
@@ -4987,74 +5127,56 @@
           <a:p>
             <a:r>
               <a:rPr lang="en-GB" dirty="0"/>
-              <a:t> </a:t>
-            </a:r>
+              <a:t>Manifest and</a:t>
+            </a:r>
+            <a:br>
+              <a:rPr lang="en-GB" dirty="0"/>
+            </a:br>
             <a:r>
               <a:rPr lang="en-GB" dirty="0" err="1"/>
-              <a:t>PSDepend</a:t>
-            </a:r>
-            <a:endParaRPr lang="en-GB" dirty="0"/>
-          </a:p>
-        </p:txBody>
-      </p:sp>
-      <p:sp>
-        <p:nvSpPr>
-          <p:cNvPr id="3" name="Content Placeholder 2">
-            <a:extLst>
-              <a:ext uri="{FF2B5EF4-FFF2-40B4-BE49-F238E27FC236}">
-                <a16:creationId xmlns:a16="http://schemas.microsoft.com/office/drawing/2014/main" id="{8571875A-E676-495D-8C7A-3F594243B15C}"/>
-              </a:ext>
-            </a:extLst>
-          </p:cNvPr>
-          <p:cNvSpPr>
-            <a:spLocks noGrp="1"/>
-          </p:cNvSpPr>
-          <p:nvPr>
-            <p:ph idx="1"/>
-          </p:nvPr>
-        </p:nvSpPr>
-        <p:spPr/>
-        <p:txBody>
-          <a:bodyPr/>
-          <a:lstStyle/>
-          <a:p>
-            <a:r>
-              <a:rPr lang="en-GB" dirty="0"/>
-              <a:t>Dependencies tracked with the code</a:t>
-            </a:r>
-          </a:p>
-          <a:p>
-            <a:endParaRPr lang="en-GB" dirty="0"/>
-          </a:p>
-          <a:p>
-            <a:endParaRPr lang="en-GB" dirty="0"/>
-          </a:p>
-          <a:p>
-            <a:r>
-              <a:rPr lang="en-GB" dirty="0"/>
-              <a:t>Primarily for Build dependencies</a:t>
-            </a:r>
-          </a:p>
-          <a:p>
-            <a:endParaRPr lang="en-GB" dirty="0"/>
-          </a:p>
-          <a:p>
-            <a:endParaRPr lang="en-GB" dirty="0"/>
-          </a:p>
-          <a:p>
-            <a:r>
-              <a:rPr lang="en-GB" dirty="0"/>
-              <a:t>Handles more than just modules</a:t>
-            </a:r>
-          </a:p>
-        </p:txBody>
-      </p:sp>
-      <p:sp>
-        <p:nvSpPr>
-          <p:cNvPr id="4" name="TextBox 3">
-            <a:extLst>
-              <a:ext uri="{FF2B5EF4-FFF2-40B4-BE49-F238E27FC236}">
-                <a16:creationId xmlns:a16="http://schemas.microsoft.com/office/drawing/2014/main" id="{14F98E8D-D939-465F-B120-B87F8809D1C1}"/>
+              <a:t>RequiredModules</a:t>
+            </a:r>
+            <a:br>
+              <a:rPr lang="en-GB" dirty="0"/>
+            </a:br>
+            <a:r>
+              <a:rPr lang="en-GB" dirty="0"/>
+              <a:t>Demo</a:t>
+            </a:r>
+          </a:p>
+        </p:txBody>
+      </p:sp>
+      <p:sp>
+        <p:nvSpPr>
+          <p:cNvPr id="5" name="Text Placeholder 4">
+            <a:extLst>
+              <a:ext uri="{FF2B5EF4-FFF2-40B4-BE49-F238E27FC236}">
+                <a16:creationId xmlns:a16="http://schemas.microsoft.com/office/drawing/2014/main" id="{0E40BEAC-AF12-4147-8076-B4DF743DCF8A}"/>
+              </a:ext>
+            </a:extLst>
+          </p:cNvPr>
+          <p:cNvSpPr>
+            <a:spLocks noGrp="1"/>
+          </p:cNvSpPr>
+          <p:nvPr>
+            <p:ph type="body" idx="1"/>
+          </p:nvPr>
+        </p:nvSpPr>
+        <p:spPr/>
+        <p:txBody>
+          <a:bodyPr/>
+          <a:lstStyle/>
+          <a:p>
+            <a:endParaRPr lang="en-GB"/>
+          </a:p>
+        </p:txBody>
+      </p:sp>
+      <p:sp>
+        <p:nvSpPr>
+          <p:cNvPr id="6" name="TextBox 5">
+            <a:extLst>
+              <a:ext uri="{FF2B5EF4-FFF2-40B4-BE49-F238E27FC236}">
+                <a16:creationId xmlns:a16="http://schemas.microsoft.com/office/drawing/2014/main" id="{1A5276C6-9508-496D-8311-558C61622E66}"/>
               </a:ext>
             </a:extLst>
           </p:cNvPr>
@@ -5111,7 +5233,7 @@
     </p:spTree>
     <p:extLst>
       <p:ext uri="{BB962C8B-B14F-4D97-AF65-F5344CB8AC3E}">
-        <p14:creationId xmlns:p14="http://schemas.microsoft.com/office/powerpoint/2010/main" val="2836989065"/>
+        <p14:creationId xmlns:p14="http://schemas.microsoft.com/office/powerpoint/2010/main" val="94953113"/>
       </p:ext>
     </p:extLst>
   </p:cSld>
@@ -5140,6 +5262,180 @@
       </p:grpSpPr>
       <p:sp>
         <p:nvSpPr>
+          <p:cNvPr id="2" name="Title 1">
+            <a:extLst>
+              <a:ext uri="{FF2B5EF4-FFF2-40B4-BE49-F238E27FC236}">
+                <a16:creationId xmlns:a16="http://schemas.microsoft.com/office/drawing/2014/main" id="{A4C1C9DC-98E4-4376-9FBD-5B69C9A23C1B}"/>
+              </a:ext>
+            </a:extLst>
+          </p:cNvPr>
+          <p:cNvSpPr>
+            <a:spLocks noGrp="1"/>
+          </p:cNvSpPr>
+          <p:nvPr>
+            <p:ph type="title"/>
+          </p:nvPr>
+        </p:nvSpPr>
+        <p:spPr/>
+        <p:txBody>
+          <a:bodyPr/>
+          <a:lstStyle/>
+          <a:p>
+            <a:r>
+              <a:rPr lang="en-GB" dirty="0"/>
+              <a:t> </a:t>
+            </a:r>
+            <a:r>
+              <a:rPr lang="en-GB" dirty="0" err="1"/>
+              <a:t>PSDepend</a:t>
+            </a:r>
+            <a:endParaRPr lang="en-GB" dirty="0"/>
+          </a:p>
+        </p:txBody>
+      </p:sp>
+      <p:sp>
+        <p:nvSpPr>
+          <p:cNvPr id="3" name="Content Placeholder 2">
+            <a:extLst>
+              <a:ext uri="{FF2B5EF4-FFF2-40B4-BE49-F238E27FC236}">
+                <a16:creationId xmlns:a16="http://schemas.microsoft.com/office/drawing/2014/main" id="{8571875A-E676-495D-8C7A-3F594243B15C}"/>
+              </a:ext>
+            </a:extLst>
+          </p:cNvPr>
+          <p:cNvSpPr>
+            <a:spLocks noGrp="1"/>
+          </p:cNvSpPr>
+          <p:nvPr>
+            <p:ph idx="1"/>
+          </p:nvPr>
+        </p:nvSpPr>
+        <p:spPr/>
+        <p:txBody>
+          <a:bodyPr/>
+          <a:lstStyle/>
+          <a:p>
+            <a:r>
+              <a:rPr lang="en-GB" dirty="0"/>
+              <a:t>Dependencies tracked with the code</a:t>
+            </a:r>
+          </a:p>
+          <a:p>
+            <a:endParaRPr lang="en-GB" dirty="0"/>
+          </a:p>
+          <a:p>
+            <a:endParaRPr lang="en-GB" dirty="0"/>
+          </a:p>
+          <a:p>
+            <a:r>
+              <a:rPr lang="en-GB" dirty="0"/>
+              <a:t>Primarily for Build dependencies</a:t>
+            </a:r>
+          </a:p>
+          <a:p>
+            <a:endParaRPr lang="en-GB" dirty="0"/>
+          </a:p>
+          <a:p>
+            <a:endParaRPr lang="en-GB" dirty="0"/>
+          </a:p>
+          <a:p>
+            <a:r>
+              <a:rPr lang="en-GB" dirty="0"/>
+              <a:t>Handles more than just modules</a:t>
+            </a:r>
+          </a:p>
+        </p:txBody>
+      </p:sp>
+      <p:sp>
+        <p:nvSpPr>
+          <p:cNvPr id="4" name="TextBox 3">
+            <a:extLst>
+              <a:ext uri="{FF2B5EF4-FFF2-40B4-BE49-F238E27FC236}">
+                <a16:creationId xmlns:a16="http://schemas.microsoft.com/office/drawing/2014/main" id="{14F98E8D-D939-465F-B120-B87F8809D1C1}"/>
+              </a:ext>
+            </a:extLst>
+          </p:cNvPr>
+          <p:cNvSpPr txBox="1"/>
+          <p:nvPr/>
+        </p:nvSpPr>
+        <p:spPr>
+          <a:xfrm>
+            <a:off x="3903464" y="6407943"/>
+            <a:ext cx="4385071" cy="369332"/>
+          </a:xfrm>
+          <a:prstGeom prst="rect">
+            <a:avLst/>
+          </a:prstGeom>
+          <a:noFill/>
+        </p:spPr>
+        <p:txBody>
+          <a:bodyPr wrap="square" rtlCol="0">
+            <a:spAutoFit/>
+          </a:bodyPr>
+          <a:lstStyle/>
+          <a:p>
+            <a:pPr algn="ctr"/>
+            <a:r>
+              <a:rPr lang="en-GB" dirty="0">
+                <a:solidFill>
+                  <a:schemeClr val="bg1">
+                    <a:lumMod val="50000"/>
+                  </a:schemeClr>
+                </a:solidFill>
+              </a:rPr>
+              <a:t>        Chris Gardner | @</a:t>
+            </a:r>
+            <a:r>
+              <a:rPr lang="en-GB" dirty="0" err="1">
+                <a:solidFill>
+                  <a:schemeClr val="bg1">
+                    <a:lumMod val="50000"/>
+                  </a:schemeClr>
+                </a:solidFill>
+              </a:rPr>
+              <a:t>HalbaradKenafin</a:t>
+            </a:r>
+            <a:endParaRPr lang="en-GB" dirty="0">
+              <a:solidFill>
+                <a:schemeClr val="bg1">
+                  <a:lumMod val="50000"/>
+                </a:schemeClr>
+              </a:solidFill>
+            </a:endParaRPr>
+          </a:p>
+        </p:txBody>
+      </p:sp>
+    </p:spTree>
+    <p:extLst>
+      <p:ext uri="{BB962C8B-B14F-4D97-AF65-F5344CB8AC3E}">
+        <p14:creationId xmlns:p14="http://schemas.microsoft.com/office/powerpoint/2010/main" val="2836989065"/>
+      </p:ext>
+    </p:extLst>
+  </p:cSld>
+  <p:clrMapOvr>
+    <a:masterClrMapping/>
+  </p:clrMapOvr>
+</p:sld>
+</file>
+
+<file path=ppt/slides/slide12.xml><?xml version="1.0" encoding="utf-8"?>
+<p:sld xmlns:a="http://schemas.openxmlformats.org/drawingml/2006/main" xmlns:r="http://schemas.openxmlformats.org/officeDocument/2006/relationships" xmlns:p="http://schemas.openxmlformats.org/presentationml/2006/main">
+  <p:cSld>
+    <p:spTree>
+      <p:nvGrpSpPr>
+        <p:cNvPr id="1" name=""/>
+        <p:cNvGrpSpPr/>
+        <p:nvPr/>
+      </p:nvGrpSpPr>
+      <p:grpSpPr>
+        <a:xfrm>
+          <a:off x="0" y="0"/>
+          <a:ext cx="0" cy="0"/>
+          <a:chOff x="0" y="0"/>
+          <a:chExt cx="0" cy="0"/>
+        </a:xfrm>
+      </p:grpSpPr>
+      <p:sp>
+        <p:nvSpPr>
           <p:cNvPr id="4" name="Title 3">
             <a:extLst>
               <a:ext uri="{FF2B5EF4-FFF2-40B4-BE49-F238E27FC236}">
@@ -5267,7 +5563,7 @@
 </p:sld>
 </file>
 
-<file path=ppt/slides/slide12.xml><?xml version="1.0" encoding="utf-8"?>
+<file path=ppt/slides/slide13.xml><?xml version="1.0" encoding="utf-8"?>
 <p:sld xmlns:a="http://schemas.openxmlformats.org/drawingml/2006/main" xmlns:r="http://schemas.openxmlformats.org/officeDocument/2006/relationships" xmlns:p="http://schemas.openxmlformats.org/presentationml/2006/main">
   <p:cSld>
     <p:spTree>
@@ -5548,6 +5844,12 @@
           </a:p>
           <a:p>
             <a:r>
+              <a:rPr lang="en-GB" dirty="0"/>
+              <a:t>Module Manifests</a:t>
+            </a:r>
+          </a:p>
+          <a:p>
+            <a:r>
               <a:rPr lang="en-GB" dirty="0" err="1"/>
               <a:t>RequiredModules</a:t>
             </a:r>
@@ -6489,7 +6791,7 @@
           <p:cNvPr id="2" name="Title 1">
             <a:extLst>
               <a:ext uri="{FF2B5EF4-FFF2-40B4-BE49-F238E27FC236}">
-                <a16:creationId xmlns:a16="http://schemas.microsoft.com/office/drawing/2014/main" id="{3C4B4671-C661-4C87-88D4-60F267B132B3}"/>
+                <a16:creationId xmlns:a16="http://schemas.microsoft.com/office/drawing/2014/main" id="{4AD11B1A-2CC1-4094-80AC-46CD063ABBC8}"/>
               </a:ext>
             </a:extLst>
           </p:cNvPr>
@@ -6507,135 +6809,89 @@
           <a:p>
             <a:r>
               <a:rPr lang="en-GB" dirty="0"/>
-              <a:t> </a:t>
+              <a:t>Module Manifests</a:t>
+            </a:r>
+          </a:p>
+        </p:txBody>
+      </p:sp>
+      <p:sp>
+        <p:nvSpPr>
+          <p:cNvPr id="3" name="Content Placeholder 2">
+            <a:extLst>
+              <a:ext uri="{FF2B5EF4-FFF2-40B4-BE49-F238E27FC236}">
+                <a16:creationId xmlns:a16="http://schemas.microsoft.com/office/drawing/2014/main" id="{1C072819-0B3D-43A9-8510-9329B46D731A}"/>
+              </a:ext>
+            </a:extLst>
+          </p:cNvPr>
+          <p:cNvSpPr>
+            <a:spLocks noGrp="1"/>
+          </p:cNvSpPr>
+          <p:nvPr>
+            <p:ph idx="1"/>
+          </p:nvPr>
+        </p:nvSpPr>
+        <p:spPr/>
+        <p:txBody>
+          <a:bodyPr/>
+          <a:lstStyle/>
+          <a:p>
+            <a:r>
+              <a:rPr lang="en-GB" dirty="0"/>
+              <a:t>Specify most of the same requirements as #requires</a:t>
+            </a:r>
+          </a:p>
+          <a:p>
+            <a:pPr lvl="1"/>
+            <a:r>
+              <a:rPr lang="en-GB" dirty="0"/>
+              <a:t>Can’t specify required </a:t>
             </a:r>
             <a:r>
               <a:rPr lang="en-GB" dirty="0" err="1"/>
-              <a:t>RequiredModules</a:t>
+              <a:t>snapins</a:t>
+            </a:r>
+            <a:r>
+              <a:rPr lang="en-GB" dirty="0"/>
+              <a:t> (and shouldn’t use them)</a:t>
+            </a:r>
+          </a:p>
+          <a:p>
+            <a:pPr lvl="1"/>
+            <a:r>
+              <a:rPr lang="en-GB" dirty="0"/>
+              <a:t>Can’t specify </a:t>
+            </a:r>
+            <a:r>
+              <a:rPr lang="en-GB" dirty="0" err="1"/>
+              <a:t>RunAsAdministrator</a:t>
             </a:r>
             <a:endParaRPr lang="en-GB" dirty="0"/>
           </a:p>
-        </p:txBody>
-      </p:sp>
-      <p:sp>
-        <p:nvSpPr>
-          <p:cNvPr id="3" name="Content Placeholder 2">
-            <a:extLst>
-              <a:ext uri="{FF2B5EF4-FFF2-40B4-BE49-F238E27FC236}">
-                <a16:creationId xmlns:a16="http://schemas.microsoft.com/office/drawing/2014/main" id="{D562E328-C379-4E43-942B-A88148ADAD8D}"/>
-              </a:ext>
-            </a:extLst>
-          </p:cNvPr>
-          <p:cNvSpPr>
-            <a:spLocks noGrp="1"/>
-          </p:cNvSpPr>
-          <p:nvPr>
-            <p:ph idx="1"/>
-          </p:nvPr>
-        </p:nvSpPr>
-        <p:spPr/>
-        <p:txBody>
-          <a:bodyPr/>
-          <a:lstStyle/>
-          <a:p>
-            <a:r>
-              <a:rPr lang="en-GB" dirty="0"/>
-              <a:t>Declared in the module manifest</a:t>
-            </a:r>
-          </a:p>
-          <a:p>
+          <a:p>
+            <a:pPr lvl="1"/>
             <a:endParaRPr lang="en-GB" dirty="0"/>
           </a:p>
           <a:p>
+            <a:r>
+              <a:rPr lang="en-GB" dirty="0"/>
+              <a:t>Every module should have a manifest</a:t>
+            </a:r>
+          </a:p>
+          <a:p>
             <a:endParaRPr lang="en-GB" dirty="0"/>
           </a:p>
           <a:p>
             <a:r>
               <a:rPr lang="en-GB" dirty="0"/>
-              <a:t>Either the name, “short” module info, or “long” module info</a:t>
-            </a:r>
-          </a:p>
-          <a:p>
-            <a:endParaRPr lang="en-GB" dirty="0"/>
-          </a:p>
-          <a:p>
-            <a:endParaRPr lang="en-GB" dirty="0"/>
-          </a:p>
-          <a:p>
-            <a:r>
-              <a:rPr lang="en-GB" dirty="0" err="1"/>
-              <a:t>PowerShellGet</a:t>
-            </a:r>
-            <a:r>
-              <a:rPr lang="en-GB" dirty="0"/>
-              <a:t> will automatically install if not already available</a:t>
-            </a:r>
-          </a:p>
-        </p:txBody>
-      </p:sp>
-      <p:sp>
-        <p:nvSpPr>
-          <p:cNvPr id="4" name="TextBox 3">
-            <a:extLst>
-              <a:ext uri="{FF2B5EF4-FFF2-40B4-BE49-F238E27FC236}">
-                <a16:creationId xmlns:a16="http://schemas.microsoft.com/office/drawing/2014/main" id="{C065E7D1-8A69-490C-949B-AD6E53702A81}"/>
-              </a:ext>
-            </a:extLst>
-          </p:cNvPr>
-          <p:cNvSpPr txBox="1"/>
-          <p:nvPr/>
-        </p:nvSpPr>
-        <p:spPr>
-          <a:xfrm>
-            <a:off x="3903464" y="6407943"/>
-            <a:ext cx="4385071" cy="369332"/>
-          </a:xfrm>
-          <a:prstGeom prst="rect">
-            <a:avLst/>
-          </a:prstGeom>
-          <a:noFill/>
-        </p:spPr>
-        <p:txBody>
-          <a:bodyPr wrap="square" rtlCol="0">
-            <a:spAutoFit/>
-          </a:bodyPr>
-          <a:lstStyle/>
-          <a:p>
-            <a:pPr algn="ctr"/>
-            <a:r>
-              <a:rPr lang="en-GB" dirty="0">
-                <a:solidFill>
-                  <a:schemeClr val="bg1">
-                    <a:lumMod val="50000"/>
-                  </a:schemeClr>
-                </a:solidFill>
-              </a:rPr>
-              <a:t>        Chris Gardner | @</a:t>
-            </a:r>
-            <a:r>
-              <a:rPr lang="en-GB" dirty="0" err="1">
-                <a:solidFill>
-                  <a:schemeClr val="bg1">
-                    <a:lumMod val="50000"/>
-                  </a:schemeClr>
-                </a:solidFill>
-              </a:rPr>
-              <a:t>HalbaradKenafin</a:t>
-            </a:r>
-            <a:endParaRPr lang="en-GB" dirty="0">
-              <a:solidFill>
-                <a:schemeClr val="bg1">
-                  <a:lumMod val="50000"/>
-                </a:schemeClr>
-              </a:solidFill>
-            </a:endParaRPr>
+              <a:t>Various extra requirements can be specified</a:t>
+            </a:r>
           </a:p>
         </p:txBody>
       </p:sp>
     </p:spTree>
     <p:extLst>
       <p:ext uri="{BB962C8B-B14F-4D97-AF65-F5344CB8AC3E}">
-        <p14:creationId xmlns:p14="http://schemas.microsoft.com/office/powerpoint/2010/main" val="4078746266"/>
+        <p14:creationId xmlns:p14="http://schemas.microsoft.com/office/powerpoint/2010/main" val="3837413042"/>
       </p:ext>
     </p:extLst>
   </p:cSld>
@@ -6664,10 +6920,10 @@
       </p:grpSpPr>
       <p:sp>
         <p:nvSpPr>
-          <p:cNvPr id="4" name="Title 3">
-            <a:extLst>
-              <a:ext uri="{FF2B5EF4-FFF2-40B4-BE49-F238E27FC236}">
-                <a16:creationId xmlns:a16="http://schemas.microsoft.com/office/drawing/2014/main" id="{4AA6EF36-62BF-465E-91C9-2431157E7E22}"/>
+          <p:cNvPr id="2" name="Title 1">
+            <a:extLst>
+              <a:ext uri="{FF2B5EF4-FFF2-40B4-BE49-F238E27FC236}">
+                <a16:creationId xmlns:a16="http://schemas.microsoft.com/office/drawing/2014/main" id="{3C4B4671-C661-4C87-88D4-60F267B132B3}"/>
               </a:ext>
             </a:extLst>
           </p:cNvPr>
@@ -6683,48 +6939,80 @@
           <a:bodyPr/>
           <a:lstStyle/>
           <a:p>
+            <a:r>
+              <a:rPr lang="en-GB" dirty="0"/>
+              <a:t> </a:t>
+            </a:r>
             <a:r>
               <a:rPr lang="en-GB" dirty="0" err="1"/>
               <a:t>RequiredModules</a:t>
             </a:r>
-            <a:r>
-              <a:rPr lang="en-GB" dirty="0"/>
-              <a:t> Demo</a:t>
-            </a:r>
-          </a:p>
-        </p:txBody>
-      </p:sp>
-      <p:sp>
-        <p:nvSpPr>
-          <p:cNvPr id="5" name="Text Placeholder 4">
-            <a:extLst>
-              <a:ext uri="{FF2B5EF4-FFF2-40B4-BE49-F238E27FC236}">
-                <a16:creationId xmlns:a16="http://schemas.microsoft.com/office/drawing/2014/main" id="{0E40BEAC-AF12-4147-8076-B4DF743DCF8A}"/>
-              </a:ext>
-            </a:extLst>
-          </p:cNvPr>
-          <p:cNvSpPr>
-            <a:spLocks noGrp="1"/>
-          </p:cNvSpPr>
-          <p:nvPr>
-            <p:ph type="body" idx="1"/>
-          </p:nvPr>
-        </p:nvSpPr>
-        <p:spPr/>
-        <p:txBody>
-          <a:bodyPr/>
-          <a:lstStyle/>
-          <a:p>
-            <a:endParaRPr lang="en-GB"/>
-          </a:p>
-        </p:txBody>
-      </p:sp>
-      <p:sp>
-        <p:nvSpPr>
-          <p:cNvPr id="6" name="TextBox 5">
-            <a:extLst>
-              <a:ext uri="{FF2B5EF4-FFF2-40B4-BE49-F238E27FC236}">
-                <a16:creationId xmlns:a16="http://schemas.microsoft.com/office/drawing/2014/main" id="{1A5276C6-9508-496D-8311-558C61622E66}"/>
+            <a:endParaRPr lang="en-GB" dirty="0"/>
+          </a:p>
+        </p:txBody>
+      </p:sp>
+      <p:sp>
+        <p:nvSpPr>
+          <p:cNvPr id="3" name="Content Placeholder 2">
+            <a:extLst>
+              <a:ext uri="{FF2B5EF4-FFF2-40B4-BE49-F238E27FC236}">
+                <a16:creationId xmlns:a16="http://schemas.microsoft.com/office/drawing/2014/main" id="{D562E328-C379-4E43-942B-A88148ADAD8D}"/>
+              </a:ext>
+            </a:extLst>
+          </p:cNvPr>
+          <p:cNvSpPr>
+            <a:spLocks noGrp="1"/>
+          </p:cNvSpPr>
+          <p:nvPr>
+            <p:ph idx="1"/>
+          </p:nvPr>
+        </p:nvSpPr>
+        <p:spPr/>
+        <p:txBody>
+          <a:bodyPr/>
+          <a:lstStyle/>
+          <a:p>
+            <a:r>
+              <a:rPr lang="en-GB" dirty="0"/>
+              <a:t>Declared in the module manifest</a:t>
+            </a:r>
+          </a:p>
+          <a:p>
+            <a:endParaRPr lang="en-GB" dirty="0"/>
+          </a:p>
+          <a:p>
+            <a:endParaRPr lang="en-GB" dirty="0"/>
+          </a:p>
+          <a:p>
+            <a:r>
+              <a:rPr lang="en-GB" dirty="0"/>
+              <a:t>Either the name, “short” module info, or “long” module info</a:t>
+            </a:r>
+          </a:p>
+          <a:p>
+            <a:endParaRPr lang="en-GB" dirty="0"/>
+          </a:p>
+          <a:p>
+            <a:endParaRPr lang="en-GB" dirty="0"/>
+          </a:p>
+          <a:p>
+            <a:r>
+              <a:rPr lang="en-GB" dirty="0" err="1"/>
+              <a:t>PowerShellGet</a:t>
+            </a:r>
+            <a:r>
+              <a:rPr lang="en-GB" dirty="0"/>
+              <a:t> will automatically install if not already available</a:t>
+            </a:r>
+          </a:p>
+        </p:txBody>
+      </p:sp>
+      <p:sp>
+        <p:nvSpPr>
+          <p:cNvPr id="4" name="TextBox 3">
+            <a:extLst>
+              <a:ext uri="{FF2B5EF4-FFF2-40B4-BE49-F238E27FC236}">
+                <a16:creationId xmlns:a16="http://schemas.microsoft.com/office/drawing/2014/main" id="{C065E7D1-8A69-490C-949B-AD6E53702A81}"/>
               </a:ext>
             </a:extLst>
           </p:cNvPr>
@@ -6781,7 +7069,7 @@
     </p:spTree>
     <p:extLst>
       <p:ext uri="{BB962C8B-B14F-4D97-AF65-F5344CB8AC3E}">
-        <p14:creationId xmlns:p14="http://schemas.microsoft.com/office/powerpoint/2010/main" val="94953113"/>
+        <p14:creationId xmlns:p14="http://schemas.microsoft.com/office/powerpoint/2010/main" val="4078746266"/>
       </p:ext>
     </p:extLst>
   </p:cSld>

</xml_diff>